<commit_message>
java with the flow ppt latest
</commit_message>
<xml_diff>
--- a/index/ppt/JavaWithTheFlow.pptx
+++ b/index/ppt/JavaWithTheFlow.pptx
@@ -5,21 +5,26 @@
     <p:sldMasterId id="2147483648" r:id="rId1"/>
   </p:sldMasterIdLst>
   <p:notesMasterIdLst>
-    <p:notesMasterId r:id="rId14"/>
+    <p:notesMasterId r:id="rId19"/>
   </p:notesMasterIdLst>
   <p:sldIdLst>
     <p:sldId id="256" r:id="rId2"/>
     <p:sldId id="261" r:id="rId3"/>
     <p:sldId id="264" r:id="rId4"/>
-    <p:sldId id="259" r:id="rId5"/>
-    <p:sldId id="257" r:id="rId6"/>
-    <p:sldId id="266" r:id="rId7"/>
-    <p:sldId id="267" r:id="rId8"/>
-    <p:sldId id="260" r:id="rId9"/>
-    <p:sldId id="268" r:id="rId10"/>
-    <p:sldId id="262" r:id="rId11"/>
-    <p:sldId id="263" r:id="rId12"/>
-    <p:sldId id="265" r:id="rId13"/>
+    <p:sldId id="269" r:id="rId5"/>
+    <p:sldId id="270" r:id="rId6"/>
+    <p:sldId id="273" r:id="rId7"/>
+    <p:sldId id="259" r:id="rId8"/>
+    <p:sldId id="257" r:id="rId9"/>
+    <p:sldId id="266" r:id="rId10"/>
+    <p:sldId id="267" r:id="rId11"/>
+    <p:sldId id="260" r:id="rId12"/>
+    <p:sldId id="272" r:id="rId13"/>
+    <p:sldId id="268" r:id="rId14"/>
+    <p:sldId id="262" r:id="rId15"/>
+    <p:sldId id="263" r:id="rId16"/>
+    <p:sldId id="271" r:id="rId17"/>
+    <p:sldId id="265" r:id="rId18"/>
   </p:sldIdLst>
   <p:sldSz cx="12192000" cy="6858000"/>
   <p:notesSz cx="6858000" cy="9144000"/>
@@ -118,6 +123,11 @@
       </a:defRPr>
     </a:lvl9pPr>
   </p:defaultTextStyle>
+  <p:extLst>
+    <p:ext uri="{EFAFB233-063F-42B5-8137-9DF3F51BA10A}">
+      <p15:sldGuideLst xmlns:p15="http://schemas.microsoft.com/office/powerpoint/2012/main"/>
+    </p:ext>
+  </p:extLst>
 </p:presentation>
 </file>
 
@@ -203,7 +213,7 @@
           <a:p>
             <a:fld id="{70BF383D-5C82-4D4F-B355-CC5C30C65C95}" type="datetimeFigureOut">
               <a:rPr lang="en-US" smtClean="0"/>
-              <a:t>2/29/16</a:t>
+              <a:t>3/2/16</a:t>
             </a:fld>
             <a:endParaRPr lang="en-US"/>
           </a:p>
@@ -703,53 +713,27 @@
           <a:bodyPr/>
           <a:lstStyle/>
           <a:p>
-            <a:pPr marL="0" marR="0" indent="0" algn="l" defTabSz="914400" rtl="0" eaLnBrk="1" fontAlgn="auto" latinLnBrk="0" hangingPunct="1">
-              <a:lnSpc>
-                <a:spcPct val="100000"/>
-              </a:lnSpc>
-              <a:spcBef>
-                <a:spcPts val="0"/>
-              </a:spcBef>
-              <a:spcAft>
-                <a:spcPts val="0"/>
-              </a:spcAft>
-              <a:buClrTx/>
-              <a:buSzTx/>
-              <a:buFontTx/>
+            <a:pPr marL="228600" indent="-228600">
+              <a:buAutoNum type="arabicPeriod"/>
+            </a:pPr>
+            <a:r>
+              <a:rPr lang="en-US" dirty="0" smtClean="0"/>
+              <a:t>Especially for new user</a:t>
+            </a:r>
+          </a:p>
+          <a:p>
+            <a:pPr marL="0" indent="0">
               <a:buNone/>
-              <a:tabLst/>
-              <a:defRPr/>
             </a:pPr>
             <a:r>
               <a:rPr lang="en-US" dirty="0" smtClean="0"/>
-              <a:t>1. Score</a:t>
-            </a:r>
-            <a:r>
-              <a:rPr lang="en-US" baseline="0" dirty="0" smtClean="0"/>
-              <a:t> – represents degree of usefulness, calculated as a weighted average of public opinion by giving more weight to novice users</a:t>
-            </a:r>
-            <a:endParaRPr lang="en-US" dirty="0" smtClean="0"/>
-          </a:p>
-          <a:p>
-            <a:endParaRPr lang="en-US" dirty="0" smtClean="0"/>
-          </a:p>
-          <a:p>
-            <a:r>
-              <a:rPr lang="en-US" dirty="0" smtClean="0"/>
-              <a:t>2.</a:t>
-            </a:r>
-            <a:r>
-              <a:rPr lang="en-US" baseline="0" dirty="0" smtClean="0"/>
-              <a:t> </a:t>
-            </a:r>
-            <a:r>
-              <a:rPr lang="en-US" dirty="0" smtClean="0"/>
-              <a:t>The posts</a:t>
-            </a:r>
-            <a:r>
-              <a:rPr lang="en-US" baseline="0" dirty="0" smtClean="0"/>
-              <a:t> are conversational – it wont make sense to have one topic associated with each posts – we need multiple</a:t>
-            </a:r>
+              <a:t> Making the system more usable by addressing the drawbacks in </a:t>
+            </a:r>
+            <a:r>
+              <a:rPr lang="en-US" dirty="0" err="1" smtClean="0"/>
+              <a:t>Stackoverfow</a:t>
+            </a:r>
+            <a:endParaRPr lang="en-US" dirty="0"/>
           </a:p>
         </p:txBody>
       </p:sp>
@@ -770,7 +754,7 @@
           <a:p>
             <a:fld id="{CF446327-AA5F-7343-A16D-2A76EB998B18}" type="slidenum">
               <a:rPr lang="en-US" smtClean="0"/>
-              <a:t>4</a:t>
+              <a:t>6</a:t>
             </a:fld>
             <a:endParaRPr lang="en-US"/>
           </a:p>
@@ -779,7 +763,7 @@
     </p:spTree>
     <p:extLst>
       <p:ext uri="{BB962C8B-B14F-4D97-AF65-F5344CB8AC3E}">
-        <p14:creationId xmlns:p14="http://schemas.microsoft.com/office/powerpoint/2010/main" val="340563072"/>
+        <p14:creationId xmlns:p14="http://schemas.microsoft.com/office/powerpoint/2010/main" val="1671157106"/>
       </p:ext>
     </p:extLst>
   </p:cSld>
@@ -833,23 +817,53 @@
           <a:bodyPr/>
           <a:lstStyle/>
           <a:p>
-            <a:r>
-              <a:rPr lang="en-US" dirty="0" smtClean="0"/>
-              <a:t>1. Interactions: voting </a:t>
-            </a:r>
-            <a:r>
-              <a:rPr lang="en-US" dirty="0" err="1" smtClean="0"/>
-              <a:t>behaviour</a:t>
-            </a:r>
-            <a:r>
-              <a:rPr lang="en-US" dirty="0" smtClean="0"/>
-              <a:t>, no.</a:t>
+            <a:pPr marL="0" marR="0" indent="0" algn="l" defTabSz="914400" rtl="0" eaLnBrk="1" fontAlgn="auto" latinLnBrk="0" hangingPunct="1">
+              <a:lnSpc>
+                <a:spcPct val="100000"/>
+              </a:lnSpc>
+              <a:spcBef>
+                <a:spcPts val="0"/>
+              </a:spcBef>
+              <a:spcAft>
+                <a:spcPts val="0"/>
+              </a:spcAft>
+              <a:buClrTx/>
+              <a:buSzTx/>
+              <a:buFontTx/>
+              <a:buNone/>
+              <a:tabLst/>
+              <a:defRPr/>
+            </a:pPr>
+            <a:r>
+              <a:rPr lang="en-US" dirty="0" smtClean="0"/>
+              <a:t>1. Score</a:t>
             </a:r>
             <a:r>
               <a:rPr lang="en-US" baseline="0" dirty="0" smtClean="0"/>
-              <a:t> of useful answers.. </a:t>
-            </a:r>
-            <a:endParaRPr lang="en-US" dirty="0"/>
+              <a:t> – represents degree of usefulness, calculated as a weighted average of public opinion by giving more weight to novice users</a:t>
+            </a:r>
+            <a:endParaRPr lang="en-US" dirty="0" smtClean="0"/>
+          </a:p>
+          <a:p>
+            <a:endParaRPr lang="en-US" dirty="0" smtClean="0"/>
+          </a:p>
+          <a:p>
+            <a:r>
+              <a:rPr lang="en-US" dirty="0" smtClean="0"/>
+              <a:t>2.</a:t>
+            </a:r>
+            <a:r>
+              <a:rPr lang="en-US" baseline="0" dirty="0" smtClean="0"/>
+              <a:t> </a:t>
+            </a:r>
+            <a:r>
+              <a:rPr lang="en-US" dirty="0" smtClean="0"/>
+              <a:t>The posts</a:t>
+            </a:r>
+            <a:r>
+              <a:rPr lang="en-US" baseline="0" dirty="0" smtClean="0"/>
+              <a:t> are conversational – it wont make sense to have one topic associated with each posts – we need multiple</a:t>
+            </a:r>
           </a:p>
         </p:txBody>
       </p:sp>
@@ -870,7 +884,7 @@
           <a:p>
             <a:fld id="{CF446327-AA5F-7343-A16D-2A76EB998B18}" type="slidenum">
               <a:rPr lang="en-US" smtClean="0"/>
-              <a:t>5</a:t>
+              <a:t>7</a:t>
             </a:fld>
             <a:endParaRPr lang="en-US"/>
           </a:p>
@@ -879,7 +893,7 @@
     </p:spTree>
     <p:extLst>
       <p:ext uri="{BB962C8B-B14F-4D97-AF65-F5344CB8AC3E}">
-        <p14:creationId xmlns:p14="http://schemas.microsoft.com/office/powerpoint/2010/main" val="88639634"/>
+        <p14:creationId xmlns:p14="http://schemas.microsoft.com/office/powerpoint/2010/main" val="340563072"/>
       </p:ext>
     </p:extLst>
   </p:cSld>
@@ -933,6 +947,106 @@
           <a:bodyPr/>
           <a:lstStyle/>
           <a:p>
+            <a:r>
+              <a:rPr lang="en-US" dirty="0" smtClean="0"/>
+              <a:t>1. Interactions: voting </a:t>
+            </a:r>
+            <a:r>
+              <a:rPr lang="en-US" dirty="0" err="1" smtClean="0"/>
+              <a:t>behaviour</a:t>
+            </a:r>
+            <a:r>
+              <a:rPr lang="en-US" dirty="0" smtClean="0"/>
+              <a:t>, no.</a:t>
+            </a:r>
+            <a:r>
+              <a:rPr lang="en-US" baseline="0" dirty="0" smtClean="0"/>
+              <a:t> of useful answers.. </a:t>
+            </a:r>
+            <a:endParaRPr lang="en-US" dirty="0"/>
+          </a:p>
+        </p:txBody>
+      </p:sp>
+      <p:sp>
+        <p:nvSpPr>
+          <p:cNvPr id="4" name="Slide Number Placeholder 3"/>
+          <p:cNvSpPr>
+            <a:spLocks noGrp="1"/>
+          </p:cNvSpPr>
+          <p:nvPr>
+            <p:ph type="sldNum" sz="quarter" idx="10"/>
+          </p:nvPr>
+        </p:nvSpPr>
+        <p:spPr/>
+        <p:txBody>
+          <a:bodyPr/>
+          <a:lstStyle/>
+          <a:p>
+            <a:fld id="{CF446327-AA5F-7343-A16D-2A76EB998B18}" type="slidenum">
+              <a:rPr lang="en-US" smtClean="0"/>
+              <a:t>8</a:t>
+            </a:fld>
+            <a:endParaRPr lang="en-US"/>
+          </a:p>
+        </p:txBody>
+      </p:sp>
+    </p:spTree>
+    <p:extLst>
+      <p:ext uri="{BB962C8B-B14F-4D97-AF65-F5344CB8AC3E}">
+        <p14:creationId xmlns:p14="http://schemas.microsoft.com/office/powerpoint/2010/main" val="88639634"/>
+      </p:ext>
+    </p:extLst>
+  </p:cSld>
+  <p:clrMapOvr>
+    <a:masterClrMapping/>
+  </p:clrMapOvr>
+</p:notes>
+</file>
+
+<file path=ppt/notesSlides/notesSlide6.xml><?xml version="1.0" encoding="utf-8"?>
+<p:notes xmlns:a="http://schemas.openxmlformats.org/drawingml/2006/main" xmlns:r="http://schemas.openxmlformats.org/officeDocument/2006/relationships" xmlns:p="http://schemas.openxmlformats.org/presentationml/2006/main">
+  <p:cSld>
+    <p:spTree>
+      <p:nvGrpSpPr>
+        <p:cNvPr id="1" name=""/>
+        <p:cNvGrpSpPr/>
+        <p:nvPr/>
+      </p:nvGrpSpPr>
+      <p:grpSpPr>
+        <a:xfrm>
+          <a:off x="0" y="0"/>
+          <a:ext cx="0" cy="0"/>
+          <a:chOff x="0" y="0"/>
+          <a:chExt cx="0" cy="0"/>
+        </a:xfrm>
+      </p:grpSpPr>
+      <p:sp>
+        <p:nvSpPr>
+          <p:cNvPr id="2" name="Slide Image Placeholder 1"/>
+          <p:cNvSpPr>
+            <a:spLocks noGrp="1" noRot="1" noChangeAspect="1"/>
+          </p:cNvSpPr>
+          <p:nvPr>
+            <p:ph type="sldImg"/>
+          </p:nvPr>
+        </p:nvSpPr>
+        <p:spPr/>
+      </p:sp>
+      <p:sp>
+        <p:nvSpPr>
+          <p:cNvPr id="3" name="Notes Placeholder 2"/>
+          <p:cNvSpPr>
+            <a:spLocks noGrp="1"/>
+          </p:cNvSpPr>
+          <p:nvPr>
+            <p:ph type="body" idx="1"/>
+          </p:nvPr>
+        </p:nvSpPr>
+        <p:spPr/>
+        <p:txBody>
+          <a:bodyPr/>
+          <a:lstStyle/>
+          <a:p>
             <a:pPr marL="228600" indent="-228600">
               <a:buAutoNum type="arabicPeriod"/>
             </a:pPr>
@@ -983,7 +1097,7 @@
           <a:p>
             <a:fld id="{CF446327-AA5F-7343-A16D-2A76EB998B18}" type="slidenum">
               <a:rPr lang="en-US" smtClean="0"/>
-              <a:t>6</a:t>
+              <a:t>9</a:t>
             </a:fld>
             <a:endParaRPr lang="en-US"/>
           </a:p>
@@ -1191,7 +1305,7 @@
             <a:fld id="{B61BEF0D-F0BB-DE4B-95CE-6DB70DBA9567}" type="datetimeFigureOut">
               <a:rPr lang="en-US" dirty="0"/>
               <a:pPr/>
-              <a:t>2/29/16</a:t>
+              <a:t>3/2/16</a:t>
             </a:fld>
             <a:endParaRPr lang="en-US" dirty="0"/>
           </a:p>
@@ -1526,7 +1640,7 @@
             <a:fld id="{B61BEF0D-F0BB-DE4B-95CE-6DB70DBA9567}" type="datetimeFigureOut">
               <a:rPr lang="en-US" dirty="0"/>
               <a:pPr/>
-              <a:t>2/29/16</a:t>
+              <a:t>3/2/16</a:t>
             </a:fld>
             <a:endParaRPr lang="en-US" dirty="0"/>
           </a:p>
@@ -1924,7 +2038,7 @@
             <a:fld id="{B61BEF0D-F0BB-DE4B-95CE-6DB70DBA9567}" type="datetimeFigureOut">
               <a:rPr lang="en-US" dirty="0"/>
               <a:pPr/>
-              <a:t>2/29/16</a:t>
+              <a:t>3/2/16</a:t>
             </a:fld>
             <a:endParaRPr lang="en-US" dirty="0"/>
           </a:p>
@@ -2257,7 +2371,7 @@
             <a:fld id="{B61BEF0D-F0BB-DE4B-95CE-6DB70DBA9567}" type="datetimeFigureOut">
               <a:rPr lang="en-US" dirty="0"/>
               <a:pPr/>
-              <a:t>2/29/16</a:t>
+              <a:t>3/2/16</a:t>
             </a:fld>
             <a:endParaRPr lang="en-US" dirty="0"/>
           </a:p>
@@ -2574,7 +2688,7 @@
             <a:fld id="{B61BEF0D-F0BB-DE4B-95CE-6DB70DBA9567}" type="datetimeFigureOut">
               <a:rPr lang="en-US" dirty="0"/>
               <a:pPr/>
-              <a:t>2/29/16</a:t>
+              <a:t>3/2/16</a:t>
             </a:fld>
             <a:endParaRPr lang="en-US" dirty="0"/>
           </a:p>
@@ -2967,7 +3081,7 @@
             <a:fld id="{B61BEF0D-F0BB-DE4B-95CE-6DB70DBA9567}" type="datetimeFigureOut">
               <a:rPr lang="en-US" dirty="0"/>
               <a:pPr/>
-              <a:t>2/29/16</a:t>
+              <a:t>3/2/16</a:t>
             </a:fld>
             <a:endParaRPr lang="en-US" dirty="0"/>
           </a:p>
@@ -3221,7 +3335,7 @@
             <a:fld id="{B61BEF0D-F0BB-DE4B-95CE-6DB70DBA9567}" type="datetimeFigureOut">
               <a:rPr lang="en-US" dirty="0"/>
               <a:pPr/>
-              <a:t>2/29/16</a:t>
+              <a:t>3/2/16</a:t>
             </a:fld>
             <a:endParaRPr lang="en-US" dirty="0"/>
           </a:p>
@@ -3480,7 +3594,7 @@
             <a:fld id="{B61BEF0D-F0BB-DE4B-95CE-6DB70DBA9567}" type="datetimeFigureOut">
               <a:rPr lang="en-US" dirty="0"/>
               <a:pPr/>
-              <a:t>2/29/16</a:t>
+              <a:t>3/2/16</a:t>
             </a:fld>
             <a:endParaRPr lang="en-US" dirty="0"/>
           </a:p>
@@ -3739,7 +3853,7 @@
             <a:fld id="{B61BEF0D-F0BB-DE4B-95CE-6DB70DBA9567}" type="datetimeFigureOut">
               <a:rPr lang="en-US" dirty="0"/>
               <a:pPr/>
-              <a:t>2/29/16</a:t>
+              <a:t>3/2/16</a:t>
             </a:fld>
             <a:endParaRPr lang="en-US" dirty="0"/>
           </a:p>
@@ -4065,7 +4179,7 @@
             <a:fld id="{B61BEF0D-F0BB-DE4B-95CE-6DB70DBA9567}" type="datetimeFigureOut">
               <a:rPr lang="en-US" dirty="0"/>
               <a:pPr/>
-              <a:t>2/29/16</a:t>
+              <a:t>3/2/16</a:t>
             </a:fld>
             <a:endParaRPr lang="en-US" dirty="0"/>
           </a:p>
@@ -4385,7 +4499,7 @@
             <a:fld id="{B61BEF0D-F0BB-DE4B-95CE-6DB70DBA9567}" type="datetimeFigureOut">
               <a:rPr lang="en-US" dirty="0"/>
               <a:pPr/>
-              <a:t>2/29/16</a:t>
+              <a:t>3/2/16</a:t>
             </a:fld>
             <a:endParaRPr lang="en-US" dirty="0"/>
           </a:p>
@@ -4839,7 +4953,7 @@
             <a:fld id="{B61BEF0D-F0BB-DE4B-95CE-6DB70DBA9567}" type="datetimeFigureOut">
               <a:rPr lang="en-US" dirty="0"/>
               <a:pPr/>
-              <a:t>2/29/16</a:t>
+              <a:t>3/2/16</a:t>
             </a:fld>
             <a:endParaRPr lang="en-US" dirty="0"/>
           </a:p>
@@ -5041,7 +5155,7 @@
             <a:fld id="{B61BEF0D-F0BB-DE4B-95CE-6DB70DBA9567}" type="datetimeFigureOut">
               <a:rPr lang="en-US" dirty="0"/>
               <a:pPr/>
-              <a:t>2/29/16</a:t>
+              <a:t>3/2/16</a:t>
             </a:fld>
             <a:endParaRPr lang="en-US" dirty="0"/>
           </a:p>
@@ -5215,7 +5329,7 @@
             <a:fld id="{B61BEF0D-F0BB-DE4B-95CE-6DB70DBA9567}" type="datetimeFigureOut">
               <a:rPr lang="en-US" dirty="0"/>
               <a:pPr/>
-              <a:t>2/29/16</a:t>
+              <a:t>3/2/16</a:t>
             </a:fld>
             <a:endParaRPr lang="en-US" dirty="0"/>
           </a:p>
@@ -5545,7 +5659,7 @@
             <a:fld id="{B61BEF0D-F0BB-DE4B-95CE-6DB70DBA9567}" type="datetimeFigureOut">
               <a:rPr lang="en-US" dirty="0"/>
               <a:pPr/>
-              <a:t>2/29/16</a:t>
+              <a:t>3/2/16</a:t>
             </a:fld>
             <a:endParaRPr lang="en-US" dirty="0"/>
           </a:p>
@@ -5887,7 +6001,7 @@
             <a:fld id="{B61BEF0D-F0BB-DE4B-95CE-6DB70DBA9567}" type="datetimeFigureOut">
               <a:rPr lang="en-US" dirty="0"/>
               <a:pPr/>
-              <a:t>2/29/16</a:t>
+              <a:t>3/2/16</a:t>
             </a:fld>
             <a:endParaRPr lang="en-US" dirty="0"/>
           </a:p>
@@ -8001,7 +8115,7 @@
             <a:fld id="{B61BEF0D-F0BB-DE4B-95CE-6DB70DBA9567}" type="datetimeFigureOut">
               <a:rPr lang="en-US" dirty="0"/>
               <a:pPr/>
-              <a:t>2/29/16</a:t>
+              <a:t>3/2/16</a:t>
             </a:fld>
             <a:endParaRPr lang="en-US" dirty="0"/>
           </a:p>
@@ -8785,13 +8899,13 @@
   <p:clrMapOvr>
     <a:masterClrMapping/>
   </p:clrMapOvr>
-  <mc:AlternateContent xmlns:mc="http://schemas.openxmlformats.org/markup-compatibility/2006">
-    <mc:Choice xmlns:p14="http://schemas.microsoft.com/office/powerpoint/2010/main" Requires="p14">
+  <mc:AlternateContent xmlns:mc="http://schemas.openxmlformats.org/markup-compatibility/2006" xmlns:p14="http://schemas.microsoft.com/office/powerpoint/2010/main">
+    <mc:Choice Requires="p14">
       <p:transition spd="med" p14:dur="700">
         <p:fade/>
       </p:transition>
     </mc:Choice>
-    <mc:Fallback>
+    <mc:Fallback xmlns="">
       <p:transition spd="med">
         <p:fade/>
       </p:transition>
@@ -8904,7 +9018,7 @@
           <a:p>
             <a:r>
               <a:rPr lang="en-US" dirty="0" smtClean="0"/>
-              <a:t>Technology Stack</a:t>
+              <a:t>System Interactions</a:t>
             </a:r>
             <a:endParaRPr lang="en-US" dirty="0"/>
           </a:p>
@@ -8927,41 +9041,91 @@
           <a:p>
             <a:r>
               <a:rPr lang="en-US" dirty="0" smtClean="0"/>
-              <a:t>Python/Flask</a:t>
-            </a:r>
-          </a:p>
-          <a:p>
-            <a:r>
-              <a:rPr lang="en-US" dirty="0" smtClean="0"/>
-              <a:t>MySQL</a:t>
-            </a:r>
-          </a:p>
-          <a:p>
-            <a:r>
-              <a:rPr lang="en-US" dirty="0" smtClean="0"/>
-              <a:t>JavaScript</a:t>
-            </a:r>
+              <a:t>Ask questions, Answer questions, Comment</a:t>
+            </a:r>
+          </a:p>
+          <a:p>
+            <a:r>
+              <a:rPr lang="en-US" dirty="0" smtClean="0"/>
+              <a:t>Update interests</a:t>
+            </a:r>
+          </a:p>
+          <a:p>
+            <a:r>
+              <a:rPr lang="en-US" dirty="0" smtClean="0"/>
+              <a:t>Rate degree of </a:t>
+            </a:r>
+            <a:r>
+              <a:rPr lang="en-US" dirty="0" smtClean="0"/>
+              <a:t>usefulness </a:t>
+            </a:r>
+            <a:r>
+              <a:rPr lang="en-US" dirty="0" smtClean="0"/>
+              <a:t>for </a:t>
+            </a:r>
+            <a:r>
+              <a:rPr lang="en-US" dirty="0" smtClean="0"/>
+              <a:t>posts and </a:t>
+            </a:r>
+            <a:r>
+              <a:rPr lang="en-US" dirty="0" smtClean="0"/>
+              <a:t>answers – not just </a:t>
+            </a:r>
+            <a:r>
+              <a:rPr lang="en-US" dirty="0" err="1" smtClean="0"/>
+              <a:t>upvotes</a:t>
+            </a:r>
+            <a:r>
+              <a:rPr lang="en-US" dirty="0" smtClean="0"/>
+              <a:t>/</a:t>
+            </a:r>
+            <a:r>
+              <a:rPr lang="en-US" dirty="0" err="1" smtClean="0"/>
+              <a:t>downvotes</a:t>
+            </a:r>
+            <a:endParaRPr lang="en-US" dirty="0" smtClean="0"/>
+          </a:p>
+          <a:p>
+            <a:r>
+              <a:rPr lang="en-US" dirty="0" smtClean="0"/>
+              <a:t>Bookmark posts</a:t>
+            </a:r>
+          </a:p>
+          <a:p>
+            <a:r>
+              <a:rPr lang="en-US" dirty="0" smtClean="0"/>
+              <a:t>Search</a:t>
+            </a:r>
+          </a:p>
+          <a:p>
+            <a:r>
+              <a:rPr lang="en-US" dirty="0"/>
+              <a:t>Follow </a:t>
+            </a:r>
+            <a:r>
+              <a:rPr lang="en-US" dirty="0" smtClean="0"/>
+              <a:t>users</a:t>
+            </a:r>
+          </a:p>
+          <a:p>
+            <a:pPr marL="0" indent="0">
+              <a:buNone/>
+            </a:pPr>
             <a:endParaRPr lang="en-US" dirty="0"/>
           </a:p>
           <a:p>
-            <a:pPr lvl="1"/>
-            <a:r>
-              <a:rPr lang="en-US" dirty="0" smtClean="0"/>
-              <a:t>Bootstrap</a:t>
-            </a:r>
-          </a:p>
-          <a:p>
-            <a:pPr lvl="1"/>
-            <a:r>
-              <a:rPr lang="en-US" dirty="0" smtClean="0"/>
-              <a:t>D3.js</a:t>
-            </a:r>
-          </a:p>
-          <a:p>
-            <a:pPr lvl="1"/>
             <a:endParaRPr lang="en-US" dirty="0" smtClean="0"/>
           </a:p>
           <a:p>
+            <a:endParaRPr lang="en-US" dirty="0" smtClean="0"/>
+          </a:p>
+          <a:p>
+            <a:endParaRPr lang="en-US" dirty="0" smtClean="0"/>
+          </a:p>
+          <a:p>
+            <a:pPr marL="457200" lvl="1" indent="0">
+              <a:buNone/>
+            </a:pPr>
             <a:endParaRPr lang="en-US" dirty="0"/>
           </a:p>
         </p:txBody>
@@ -8969,25 +9133,13 @@
     </p:spTree>
     <p:extLst>
       <p:ext uri="{BB962C8B-B14F-4D97-AF65-F5344CB8AC3E}">
-        <p14:creationId xmlns:p14="http://schemas.microsoft.com/office/powerpoint/2010/main" val="1503885238"/>
+        <p14:creationId xmlns:p14="http://schemas.microsoft.com/office/powerpoint/2010/main" val="2081572601"/>
       </p:ext>
     </p:extLst>
   </p:cSld>
   <p:clrMapOvr>
     <a:masterClrMapping/>
   </p:clrMapOvr>
-  <mc:AlternateContent xmlns:mc="http://schemas.openxmlformats.org/markup-compatibility/2006">
-    <mc:Choice xmlns:p14="http://schemas.microsoft.com/office/powerpoint/2010/main" Requires="p14">
-      <p:transition spd="med" p14:dur="700">
-        <p:fade/>
-      </p:transition>
-    </mc:Choice>
-    <mc:Fallback>
-      <p:transition spd="med">
-        <p:fade/>
-      </p:transition>
-    </mc:Fallback>
-  </mc:AlternateContent>
   <p:timing>
     <p:tnLst>
       <p:par>
@@ -9032,191 +9184,58 @@
           <a:p>
             <a:r>
               <a:rPr lang="en-US" dirty="0" smtClean="0"/>
-              <a:t>Development Plan</a:t>
+              <a:t>Prototype</a:t>
             </a:r>
             <a:endParaRPr lang="en-US" dirty="0"/>
           </a:p>
         </p:txBody>
       </p:sp>
-      <p:sp>
-        <p:nvSpPr>
-          <p:cNvPr id="5" name="Content Placeholder 4"/>
-          <p:cNvSpPr>
-            <a:spLocks noGrp="1"/>
-          </p:cNvSpPr>
+      <p:pic>
+        <p:nvPicPr>
+          <p:cNvPr id="4" name="Content Placeholder 3"/>
+          <p:cNvPicPr>
+            <a:picLocks noGrp="1" noChangeAspect="1"/>
+          </p:cNvPicPr>
           <p:nvPr>
             <p:ph idx="1"/>
           </p:nvPr>
-        </p:nvSpPr>
+        </p:nvPicPr>
+        <p:blipFill>
+          <a:blip r:embed="rId2">
+            <a:extLst>
+              <a:ext uri="{28A0092B-C50C-407E-A947-70E740481C1C}">
+                <a14:useLocalDpi xmlns:a14="http://schemas.microsoft.com/office/drawing/2010/main" val="0"/>
+              </a:ext>
+            </a:extLst>
+          </a:blip>
+          <a:stretch>
+            <a:fillRect/>
+          </a:stretch>
+        </p:blipFill>
         <p:spPr>
           <a:xfrm>
-            <a:off x="2589212" y="1664413"/>
-            <a:ext cx="8915400" cy="4664467"/>
+            <a:off x="2731784" y="1422577"/>
+            <a:ext cx="6704963" cy="5040806"/>
           </a:xfrm>
         </p:spPr>
-        <p:txBody>
-          <a:bodyPr>
-            <a:normAutofit fontScale="55000" lnSpcReduction="20000"/>
-          </a:bodyPr>
-          <a:lstStyle/>
-          <a:p>
-            <a:r>
-              <a:rPr lang="en-US" dirty="0" smtClean="0"/>
-              <a:t>Current Status</a:t>
-            </a:r>
-          </a:p>
-          <a:p>
-            <a:pPr lvl="1"/>
-            <a:r>
-              <a:rPr lang="en-US" dirty="0" smtClean="0"/>
-              <a:t>Collected data from </a:t>
-            </a:r>
-            <a:r>
-              <a:rPr lang="en-US" dirty="0" err="1" smtClean="0"/>
-              <a:t>StackOverflow</a:t>
-            </a:r>
-            <a:endParaRPr lang="en-US" dirty="0" smtClean="0"/>
-          </a:p>
-          <a:p>
-            <a:pPr lvl="1"/>
-            <a:r>
-              <a:rPr lang="en-US" dirty="0"/>
-              <a:t>Created </a:t>
-            </a:r>
-            <a:r>
-              <a:rPr lang="en-US" dirty="0" smtClean="0"/>
-              <a:t>database </a:t>
-            </a:r>
-          </a:p>
-          <a:p>
-            <a:pPr lvl="1"/>
-            <a:r>
-              <a:rPr lang="en-US" dirty="0" smtClean="0"/>
-              <a:t>Identified Java topics to categorize posts</a:t>
-            </a:r>
-          </a:p>
-          <a:p>
-            <a:pPr lvl="1"/>
-            <a:r>
-              <a:rPr lang="en-US" dirty="0" smtClean="0"/>
-              <a:t>Designed Mock UI</a:t>
-            </a:r>
-          </a:p>
-          <a:p>
-            <a:endParaRPr lang="en-US" dirty="0"/>
-          </a:p>
-          <a:p>
-            <a:r>
-              <a:rPr lang="en-US" dirty="0" smtClean="0"/>
-              <a:t>Phase 1 –  March 11th</a:t>
-            </a:r>
-          </a:p>
-          <a:p>
-            <a:pPr lvl="1"/>
-            <a:r>
-              <a:rPr lang="en-US" dirty="0" smtClean="0"/>
-              <a:t>Clustering posts</a:t>
-            </a:r>
-          </a:p>
-          <a:p>
-            <a:pPr lvl="1"/>
-            <a:r>
-              <a:rPr lang="en-US" dirty="0" smtClean="0"/>
-              <a:t>User interface</a:t>
-            </a:r>
-          </a:p>
-          <a:p>
-            <a:endParaRPr lang="en-US" dirty="0"/>
-          </a:p>
-          <a:p>
-            <a:r>
-              <a:rPr lang="en-US" dirty="0" smtClean="0"/>
-              <a:t>Phase 2 – March 25</a:t>
-            </a:r>
-            <a:r>
-              <a:rPr lang="en-US" baseline="30000" dirty="0" smtClean="0"/>
-              <a:t>th</a:t>
-            </a:r>
-          </a:p>
-          <a:p>
-            <a:pPr lvl="1"/>
-            <a:r>
-              <a:rPr lang="en-US" dirty="0"/>
-              <a:t>Implementing user and </a:t>
-            </a:r>
-            <a:r>
-              <a:rPr lang="en-US" dirty="0" smtClean="0"/>
-              <a:t>content models</a:t>
-            </a:r>
-          </a:p>
-          <a:p>
-            <a:pPr lvl="1"/>
-            <a:r>
-              <a:rPr lang="en-US" dirty="0" smtClean="0"/>
-              <a:t>Adaptation system</a:t>
-            </a:r>
-          </a:p>
-          <a:p>
-            <a:endParaRPr lang="en-US" dirty="0"/>
-          </a:p>
-          <a:p>
-            <a:r>
-              <a:rPr lang="en-US" dirty="0" smtClean="0"/>
-              <a:t>Phase 3 – April 8</a:t>
-            </a:r>
-            <a:r>
-              <a:rPr lang="en-US" baseline="30000" dirty="0" smtClean="0"/>
-              <a:t>th</a:t>
-            </a:r>
-            <a:r>
-              <a:rPr lang="en-US" dirty="0" smtClean="0"/>
-              <a:t> </a:t>
-            </a:r>
-          </a:p>
-          <a:p>
-            <a:pPr lvl="1"/>
-            <a:r>
-              <a:rPr lang="en-US" dirty="0" smtClean="0"/>
-              <a:t>System Integration </a:t>
-            </a:r>
-          </a:p>
-          <a:p>
-            <a:pPr lvl="1"/>
-            <a:endParaRPr lang="en-US" dirty="0" smtClean="0"/>
-          </a:p>
-          <a:p>
-            <a:r>
-              <a:rPr lang="en-US" dirty="0" smtClean="0"/>
-              <a:t>Final Phase </a:t>
-            </a:r>
-          </a:p>
-          <a:p>
-            <a:pPr lvl="1"/>
-            <a:r>
-              <a:rPr lang="en-US" dirty="0" smtClean="0"/>
-              <a:t>Evaluation</a:t>
-            </a:r>
-            <a:endParaRPr lang="en-US" dirty="0"/>
-          </a:p>
-        </p:txBody>
-      </p:sp>
+      </p:pic>
     </p:spTree>
     <p:extLst>
       <p:ext uri="{BB962C8B-B14F-4D97-AF65-F5344CB8AC3E}">
-        <p14:creationId xmlns:p14="http://schemas.microsoft.com/office/powerpoint/2010/main" val="1665204916"/>
+        <p14:creationId xmlns:p14="http://schemas.microsoft.com/office/powerpoint/2010/main" val="709393584"/>
       </p:ext>
     </p:extLst>
   </p:cSld>
   <p:clrMapOvr>
     <a:masterClrMapping/>
   </p:clrMapOvr>
-  <mc:AlternateContent xmlns:mc="http://schemas.openxmlformats.org/markup-compatibility/2006">
-    <mc:Choice xmlns:p14="http://schemas.microsoft.com/office/powerpoint/2010/main" Requires="p14">
+  <mc:AlternateContent xmlns:mc="http://schemas.openxmlformats.org/markup-compatibility/2006" xmlns:p14="http://schemas.microsoft.com/office/powerpoint/2010/main">
+    <mc:Choice Requires="p14">
       <p:transition spd="med" p14:dur="700">
         <p:fade/>
       </p:transition>
     </mc:Choice>
-    <mc:Fallback>
+    <mc:Fallback xmlns="">
       <p:transition spd="med">
         <p:fade/>
       </p:transition>
@@ -9264,18 +9283,88 @@
           <a:bodyPr/>
           <a:lstStyle/>
           <a:p>
-            <a:endParaRPr lang="en-US"/>
-          </a:p>
-        </p:txBody>
-      </p:sp>
-      <p:sp>
-        <p:nvSpPr>
-          <p:cNvPr id="3" name="Content Placeholder 2"/>
-          <p:cNvSpPr>
-            <a:spLocks noGrp="1"/>
-          </p:cNvSpPr>
+            <a:r>
+              <a:rPr lang="en-US" dirty="0" smtClean="0"/>
+              <a:t>Prototype</a:t>
+            </a:r>
+            <a:endParaRPr lang="en-US" dirty="0"/>
+          </a:p>
+        </p:txBody>
+      </p:sp>
+      <p:pic>
+        <p:nvPicPr>
+          <p:cNvPr id="4" name="Content Placeholder 3"/>
+          <p:cNvPicPr>
+            <a:picLocks noGrp="1" noChangeAspect="1"/>
+          </p:cNvPicPr>
           <p:nvPr>
             <p:ph idx="1"/>
+          </p:nvPr>
+        </p:nvPicPr>
+        <p:blipFill>
+          <a:blip r:embed="rId2">
+            <a:extLst>
+              <a:ext uri="{28A0092B-C50C-407E-A947-70E740481C1C}">
+                <a14:useLocalDpi xmlns:a14="http://schemas.microsoft.com/office/drawing/2010/main" val="0"/>
+              </a:ext>
+            </a:extLst>
+          </a:blip>
+          <a:stretch>
+            <a:fillRect/>
+          </a:stretch>
+        </p:blipFill>
+        <p:spPr>
+          <a:xfrm>
+            <a:off x="2285485" y="1490597"/>
+            <a:ext cx="9526565" cy="4609143"/>
+          </a:xfrm>
+        </p:spPr>
+      </p:pic>
+    </p:spTree>
+    <p:extLst>
+      <p:ext uri="{BB962C8B-B14F-4D97-AF65-F5344CB8AC3E}">
+        <p14:creationId xmlns:p14="http://schemas.microsoft.com/office/powerpoint/2010/main" val="1228691975"/>
+      </p:ext>
+    </p:extLst>
+  </p:cSld>
+  <p:clrMapOvr>
+    <a:masterClrMapping/>
+  </p:clrMapOvr>
+  <p:timing>
+    <p:tnLst>
+      <p:par>
+        <p:cTn id="1" dur="indefinite" restart="never" nodeType="tmRoot"/>
+      </p:par>
+    </p:tnLst>
+  </p:timing>
+</p:sld>
+</file>
+
+<file path=ppt/slides/slide13.xml><?xml version="1.0" encoding="utf-8"?>
+<p:sld xmlns:a="http://schemas.openxmlformats.org/drawingml/2006/main" xmlns:r="http://schemas.openxmlformats.org/officeDocument/2006/relationships" xmlns:p="http://schemas.openxmlformats.org/presentationml/2006/main">
+  <p:cSld>
+    <p:spTree>
+      <p:nvGrpSpPr>
+        <p:cNvPr id="1" name=""/>
+        <p:cNvGrpSpPr/>
+        <p:nvPr/>
+      </p:nvGrpSpPr>
+      <p:grpSpPr>
+        <a:xfrm>
+          <a:off x="0" y="0"/>
+          <a:ext cx="0" cy="0"/>
+          <a:chOff x="0" y="0"/>
+          <a:chExt cx="0" cy="0"/>
+        </a:xfrm>
+      </p:grpSpPr>
+      <p:sp>
+        <p:nvSpPr>
+          <p:cNvPr id="2" name="Title 1"/>
+          <p:cNvSpPr>
+            <a:spLocks noGrp="1"/>
+          </p:cNvSpPr>
+          <p:nvPr>
+            <p:ph type="title"/>
           </p:nvPr>
         </p:nvSpPr>
         <p:spPr/>
@@ -9283,7 +9372,610 @@
           <a:bodyPr/>
           <a:lstStyle/>
           <a:p>
+            <a:r>
+              <a:rPr lang="en-US" dirty="0" smtClean="0"/>
+              <a:t>Evaluation</a:t>
+            </a:r>
             <a:endParaRPr lang="en-US" dirty="0"/>
+          </a:p>
+        </p:txBody>
+      </p:sp>
+      <p:sp>
+        <p:nvSpPr>
+          <p:cNvPr id="3" name="Content Placeholder 2"/>
+          <p:cNvSpPr>
+            <a:spLocks noGrp="1"/>
+          </p:cNvSpPr>
+          <p:nvPr>
+            <p:ph idx="1"/>
+          </p:nvPr>
+        </p:nvSpPr>
+        <p:spPr/>
+        <p:txBody>
+          <a:bodyPr/>
+          <a:lstStyle/>
+          <a:p>
+            <a:r>
+              <a:rPr lang="en-US" dirty="0" smtClean="0"/>
+              <a:t>Design two sets of similar tasks  </a:t>
+            </a:r>
+          </a:p>
+          <a:p>
+            <a:r>
+              <a:rPr lang="en-US" dirty="0" smtClean="0"/>
+              <a:t>Find volunteers to execute the tasks on both existing and new system, alternatively</a:t>
+            </a:r>
+          </a:p>
+          <a:p>
+            <a:r>
+              <a:rPr lang="en-US" dirty="0" smtClean="0"/>
+              <a:t>Compare performance metrics</a:t>
+            </a:r>
+          </a:p>
+          <a:p>
+            <a:r>
+              <a:rPr lang="en-US" dirty="0" smtClean="0"/>
+              <a:t>Collect user feedback on system usability </a:t>
+            </a:r>
+            <a:endParaRPr lang="en-US" dirty="0"/>
+          </a:p>
+        </p:txBody>
+      </p:sp>
+    </p:spTree>
+    <p:extLst>
+      <p:ext uri="{BB962C8B-B14F-4D97-AF65-F5344CB8AC3E}">
+        <p14:creationId xmlns:p14="http://schemas.microsoft.com/office/powerpoint/2010/main" val="1588279465"/>
+      </p:ext>
+    </p:extLst>
+  </p:cSld>
+  <p:clrMapOvr>
+    <a:masterClrMapping/>
+  </p:clrMapOvr>
+  <p:timing>
+    <p:tnLst>
+      <p:par>
+        <p:cTn id="1" dur="indefinite" restart="never" nodeType="tmRoot"/>
+      </p:par>
+    </p:tnLst>
+  </p:timing>
+</p:sld>
+</file>
+
+<file path=ppt/slides/slide14.xml><?xml version="1.0" encoding="utf-8"?>
+<p:sld xmlns:a="http://schemas.openxmlformats.org/drawingml/2006/main" xmlns:r="http://schemas.openxmlformats.org/officeDocument/2006/relationships" xmlns:p="http://schemas.openxmlformats.org/presentationml/2006/main">
+  <p:cSld>
+    <p:spTree>
+      <p:nvGrpSpPr>
+        <p:cNvPr id="1" name=""/>
+        <p:cNvGrpSpPr/>
+        <p:nvPr/>
+      </p:nvGrpSpPr>
+      <p:grpSpPr>
+        <a:xfrm>
+          <a:off x="0" y="0"/>
+          <a:ext cx="0" cy="0"/>
+          <a:chOff x="0" y="0"/>
+          <a:chExt cx="0" cy="0"/>
+        </a:xfrm>
+      </p:grpSpPr>
+      <p:sp>
+        <p:nvSpPr>
+          <p:cNvPr id="2" name="Title 1"/>
+          <p:cNvSpPr>
+            <a:spLocks noGrp="1"/>
+          </p:cNvSpPr>
+          <p:nvPr>
+            <p:ph type="title"/>
+          </p:nvPr>
+        </p:nvSpPr>
+        <p:spPr/>
+        <p:txBody>
+          <a:bodyPr/>
+          <a:lstStyle/>
+          <a:p>
+            <a:r>
+              <a:rPr lang="en-US" dirty="0" smtClean="0"/>
+              <a:t>Technology Stack</a:t>
+            </a:r>
+            <a:endParaRPr lang="en-US" dirty="0"/>
+          </a:p>
+        </p:txBody>
+      </p:sp>
+      <p:sp>
+        <p:nvSpPr>
+          <p:cNvPr id="3" name="Content Placeholder 2"/>
+          <p:cNvSpPr>
+            <a:spLocks noGrp="1"/>
+          </p:cNvSpPr>
+          <p:nvPr>
+            <p:ph idx="1"/>
+          </p:nvPr>
+        </p:nvSpPr>
+        <p:spPr/>
+        <p:txBody>
+          <a:bodyPr/>
+          <a:lstStyle/>
+          <a:p>
+            <a:r>
+              <a:rPr lang="en-US" dirty="0" smtClean="0"/>
+              <a:t>Python/Flask</a:t>
+            </a:r>
+          </a:p>
+          <a:p>
+            <a:r>
+              <a:rPr lang="en-US" dirty="0" smtClean="0"/>
+              <a:t>MySQL</a:t>
+            </a:r>
+          </a:p>
+          <a:p>
+            <a:r>
+              <a:rPr lang="en-US" dirty="0" smtClean="0"/>
+              <a:t>JavaScript</a:t>
+            </a:r>
+            <a:endParaRPr lang="en-US" dirty="0"/>
+          </a:p>
+          <a:p>
+            <a:pPr lvl="1"/>
+            <a:r>
+              <a:rPr lang="en-US" dirty="0" smtClean="0"/>
+              <a:t>Bootstrap</a:t>
+            </a:r>
+          </a:p>
+          <a:p>
+            <a:pPr lvl="1"/>
+            <a:r>
+              <a:rPr lang="en-US" dirty="0" smtClean="0"/>
+              <a:t>D3.js</a:t>
+            </a:r>
+          </a:p>
+          <a:p>
+            <a:r>
+              <a:rPr lang="en-US" dirty="0" err="1" smtClean="0"/>
+              <a:t>Lucene</a:t>
+            </a:r>
+            <a:r>
+              <a:rPr lang="en-US" dirty="0" smtClean="0"/>
+              <a:t>/ </a:t>
+            </a:r>
+            <a:r>
+              <a:rPr lang="en-US" dirty="0" err="1" smtClean="0"/>
+              <a:t>Solr</a:t>
+            </a:r>
+            <a:endParaRPr lang="en-US" dirty="0" smtClean="0"/>
+          </a:p>
+          <a:p>
+            <a:r>
+              <a:rPr lang="en-US" dirty="0" smtClean="0"/>
+              <a:t>NLTK</a:t>
+            </a:r>
+            <a:endParaRPr lang="en-US" dirty="0" smtClean="0"/>
+          </a:p>
+          <a:p>
+            <a:endParaRPr lang="en-US" dirty="0"/>
+          </a:p>
+        </p:txBody>
+      </p:sp>
+    </p:spTree>
+    <p:extLst>
+      <p:ext uri="{BB962C8B-B14F-4D97-AF65-F5344CB8AC3E}">
+        <p14:creationId xmlns:p14="http://schemas.microsoft.com/office/powerpoint/2010/main" val="1503885238"/>
+      </p:ext>
+    </p:extLst>
+  </p:cSld>
+  <p:clrMapOvr>
+    <a:masterClrMapping/>
+  </p:clrMapOvr>
+  <mc:AlternateContent xmlns:mc="http://schemas.openxmlformats.org/markup-compatibility/2006" xmlns:p14="http://schemas.microsoft.com/office/powerpoint/2010/main">
+    <mc:Choice Requires="p14">
+      <p:transition spd="med" p14:dur="700">
+        <p:fade/>
+      </p:transition>
+    </mc:Choice>
+    <mc:Fallback xmlns="">
+      <p:transition spd="med">
+        <p:fade/>
+      </p:transition>
+    </mc:Fallback>
+  </mc:AlternateContent>
+  <p:timing>
+    <p:tnLst>
+      <p:par>
+        <p:cTn id="1" dur="indefinite" restart="never" nodeType="tmRoot"/>
+      </p:par>
+    </p:tnLst>
+  </p:timing>
+</p:sld>
+</file>
+
+<file path=ppt/slides/slide15.xml><?xml version="1.0" encoding="utf-8"?>
+<p:sld xmlns:a="http://schemas.openxmlformats.org/drawingml/2006/main" xmlns:r="http://schemas.openxmlformats.org/officeDocument/2006/relationships" xmlns:p="http://schemas.openxmlformats.org/presentationml/2006/main">
+  <p:cSld>
+    <p:spTree>
+      <p:nvGrpSpPr>
+        <p:cNvPr id="1" name=""/>
+        <p:cNvGrpSpPr/>
+        <p:nvPr/>
+      </p:nvGrpSpPr>
+      <p:grpSpPr>
+        <a:xfrm>
+          <a:off x="0" y="0"/>
+          <a:ext cx="0" cy="0"/>
+          <a:chOff x="0" y="0"/>
+          <a:chExt cx="0" cy="0"/>
+        </a:xfrm>
+      </p:grpSpPr>
+      <p:sp>
+        <p:nvSpPr>
+          <p:cNvPr id="2" name="Title 1"/>
+          <p:cNvSpPr>
+            <a:spLocks noGrp="1"/>
+          </p:cNvSpPr>
+          <p:nvPr>
+            <p:ph type="title"/>
+          </p:nvPr>
+        </p:nvSpPr>
+        <p:spPr/>
+        <p:txBody>
+          <a:bodyPr/>
+          <a:lstStyle/>
+          <a:p>
+            <a:r>
+              <a:rPr lang="en-US" dirty="0" smtClean="0"/>
+              <a:t>Development Plan</a:t>
+            </a:r>
+            <a:endParaRPr lang="en-US" dirty="0"/>
+          </a:p>
+        </p:txBody>
+      </p:sp>
+      <p:sp>
+        <p:nvSpPr>
+          <p:cNvPr id="5" name="Content Placeholder 4"/>
+          <p:cNvSpPr>
+            <a:spLocks noGrp="1"/>
+          </p:cNvSpPr>
+          <p:nvPr>
+            <p:ph idx="1"/>
+          </p:nvPr>
+        </p:nvSpPr>
+        <p:spPr>
+          <a:xfrm>
+            <a:off x="2589212" y="1664413"/>
+            <a:ext cx="8915400" cy="4664467"/>
+          </a:xfrm>
+        </p:spPr>
+        <p:txBody>
+          <a:bodyPr>
+            <a:normAutofit/>
+          </a:bodyPr>
+          <a:lstStyle/>
+          <a:p>
+            <a:r>
+              <a:rPr lang="en-US" dirty="0" smtClean="0"/>
+              <a:t>Current Status</a:t>
+            </a:r>
+          </a:p>
+          <a:p>
+            <a:pPr lvl="1"/>
+            <a:r>
+              <a:rPr lang="en-US" dirty="0" smtClean="0"/>
+              <a:t>Collected data from </a:t>
+            </a:r>
+            <a:r>
+              <a:rPr lang="en-US" dirty="0" err="1" smtClean="0"/>
+              <a:t>StackOverflow</a:t>
+            </a:r>
+            <a:endParaRPr lang="en-US" dirty="0" smtClean="0"/>
+          </a:p>
+          <a:p>
+            <a:pPr lvl="1"/>
+            <a:r>
+              <a:rPr lang="en-US" dirty="0"/>
+              <a:t>Created </a:t>
+            </a:r>
+            <a:r>
+              <a:rPr lang="en-US" dirty="0" smtClean="0"/>
+              <a:t>database </a:t>
+            </a:r>
+          </a:p>
+          <a:p>
+            <a:pPr lvl="1"/>
+            <a:r>
+              <a:rPr lang="en-US" dirty="0" smtClean="0"/>
+              <a:t>Designed Mock UI</a:t>
+            </a:r>
+          </a:p>
+          <a:p>
+            <a:endParaRPr lang="en-US" dirty="0" smtClean="0"/>
+          </a:p>
+          <a:p>
+            <a:endParaRPr lang="en-US" dirty="0"/>
+          </a:p>
+          <a:p>
+            <a:r>
+              <a:rPr lang="en-US" dirty="0" smtClean="0"/>
+              <a:t>Phase 1 –  March 11th</a:t>
+            </a:r>
+          </a:p>
+          <a:p>
+            <a:pPr lvl="1"/>
+            <a:r>
+              <a:rPr lang="en-US" dirty="0" smtClean="0"/>
+              <a:t>Clustering posts</a:t>
+            </a:r>
+          </a:p>
+          <a:p>
+            <a:pPr lvl="1"/>
+            <a:r>
+              <a:rPr lang="en-US" dirty="0" smtClean="0"/>
+              <a:t>User interface</a:t>
+            </a:r>
+          </a:p>
+        </p:txBody>
+      </p:sp>
+    </p:spTree>
+    <p:extLst>
+      <p:ext uri="{BB962C8B-B14F-4D97-AF65-F5344CB8AC3E}">
+        <p14:creationId xmlns:p14="http://schemas.microsoft.com/office/powerpoint/2010/main" val="1665204916"/>
+      </p:ext>
+    </p:extLst>
+  </p:cSld>
+  <p:clrMapOvr>
+    <a:masterClrMapping/>
+  </p:clrMapOvr>
+  <mc:AlternateContent xmlns:mc="http://schemas.openxmlformats.org/markup-compatibility/2006" xmlns:p14="http://schemas.microsoft.com/office/powerpoint/2010/main">
+    <mc:Choice Requires="p14">
+      <p:transition spd="med" p14:dur="700">
+        <p:fade/>
+      </p:transition>
+    </mc:Choice>
+    <mc:Fallback xmlns="">
+      <p:transition spd="med">
+        <p:fade/>
+      </p:transition>
+    </mc:Fallback>
+  </mc:AlternateContent>
+  <p:timing>
+    <p:tnLst>
+      <p:par>
+        <p:cTn id="1" dur="indefinite" restart="never" nodeType="tmRoot"/>
+      </p:par>
+    </p:tnLst>
+  </p:timing>
+</p:sld>
+</file>
+
+<file path=ppt/slides/slide16.xml><?xml version="1.0" encoding="utf-8"?>
+<p:sld xmlns:a="http://schemas.openxmlformats.org/drawingml/2006/main" xmlns:r="http://schemas.openxmlformats.org/officeDocument/2006/relationships" xmlns:p="http://schemas.openxmlformats.org/presentationml/2006/main">
+  <p:cSld>
+    <p:spTree>
+      <p:nvGrpSpPr>
+        <p:cNvPr id="1" name=""/>
+        <p:cNvGrpSpPr/>
+        <p:nvPr/>
+      </p:nvGrpSpPr>
+      <p:grpSpPr>
+        <a:xfrm>
+          <a:off x="0" y="0"/>
+          <a:ext cx="0" cy="0"/>
+          <a:chOff x="0" y="0"/>
+          <a:chExt cx="0" cy="0"/>
+        </a:xfrm>
+      </p:grpSpPr>
+      <p:sp>
+        <p:nvSpPr>
+          <p:cNvPr id="2" name="Title 1"/>
+          <p:cNvSpPr>
+            <a:spLocks noGrp="1"/>
+          </p:cNvSpPr>
+          <p:nvPr>
+            <p:ph type="title"/>
+          </p:nvPr>
+        </p:nvSpPr>
+        <p:spPr/>
+        <p:txBody>
+          <a:bodyPr/>
+          <a:lstStyle/>
+          <a:p>
+            <a:r>
+              <a:rPr lang="en-US" dirty="0"/>
+              <a:t>Development Plan</a:t>
+            </a:r>
+            <a:endParaRPr lang="en-IN" dirty="0"/>
+          </a:p>
+        </p:txBody>
+      </p:sp>
+      <p:sp>
+        <p:nvSpPr>
+          <p:cNvPr id="3" name="Content Placeholder 2"/>
+          <p:cNvSpPr>
+            <a:spLocks noGrp="1"/>
+          </p:cNvSpPr>
+          <p:nvPr>
+            <p:ph idx="1"/>
+          </p:nvPr>
+        </p:nvSpPr>
+        <p:spPr/>
+        <p:txBody>
+          <a:bodyPr>
+            <a:normAutofit lnSpcReduction="10000"/>
+          </a:bodyPr>
+          <a:lstStyle/>
+          <a:p>
+            <a:endParaRPr lang="en-US" dirty="0"/>
+          </a:p>
+          <a:p>
+            <a:r>
+              <a:rPr lang="en-US" dirty="0"/>
+              <a:t>Phase 2 – March 25</a:t>
+            </a:r>
+            <a:r>
+              <a:rPr lang="en-US" baseline="30000" dirty="0"/>
+              <a:t>th</a:t>
+            </a:r>
+          </a:p>
+          <a:p>
+            <a:pPr lvl="1"/>
+            <a:r>
+              <a:rPr lang="en-US" dirty="0"/>
+              <a:t>Implementing user and content models</a:t>
+            </a:r>
+          </a:p>
+          <a:p>
+            <a:pPr lvl="1"/>
+            <a:r>
+              <a:rPr lang="en-US" dirty="0"/>
+              <a:t>Adaptation system</a:t>
+            </a:r>
+          </a:p>
+          <a:p>
+            <a:endParaRPr lang="en-US" dirty="0"/>
+          </a:p>
+          <a:p>
+            <a:r>
+              <a:rPr lang="en-US" dirty="0"/>
+              <a:t>Phase 3 – April 8</a:t>
+            </a:r>
+            <a:r>
+              <a:rPr lang="en-US" baseline="30000" dirty="0"/>
+              <a:t>th</a:t>
+            </a:r>
+            <a:r>
+              <a:rPr lang="en-US" dirty="0"/>
+              <a:t> </a:t>
+            </a:r>
+          </a:p>
+          <a:p>
+            <a:pPr lvl="1"/>
+            <a:r>
+              <a:rPr lang="en-US" dirty="0"/>
+              <a:t>System Integration </a:t>
+            </a:r>
+          </a:p>
+          <a:p>
+            <a:pPr lvl="1"/>
+            <a:endParaRPr lang="en-US" dirty="0"/>
+          </a:p>
+          <a:p>
+            <a:r>
+              <a:rPr lang="en-US" dirty="0"/>
+              <a:t>Final Phase </a:t>
+            </a:r>
+          </a:p>
+          <a:p>
+            <a:pPr lvl="1"/>
+            <a:r>
+              <a:rPr lang="en-US" dirty="0"/>
+              <a:t>Evaluation</a:t>
+            </a:r>
+          </a:p>
+          <a:p>
+            <a:endParaRPr lang="en-IN" dirty="0"/>
+          </a:p>
+        </p:txBody>
+      </p:sp>
+    </p:spTree>
+    <p:extLst>
+      <p:ext uri="{BB962C8B-B14F-4D97-AF65-F5344CB8AC3E}">
+        <p14:creationId xmlns:p14="http://schemas.microsoft.com/office/powerpoint/2010/main" val="3472667569"/>
+      </p:ext>
+    </p:extLst>
+  </p:cSld>
+  <p:clrMapOvr>
+    <a:masterClrMapping/>
+  </p:clrMapOvr>
+  <p:timing>
+    <p:tnLst>
+      <p:par>
+        <p:cTn id="1" dur="indefinite" restart="never" nodeType="tmRoot"/>
+      </p:par>
+    </p:tnLst>
+  </p:timing>
+</p:sld>
+</file>
+
+<file path=ppt/slides/slide17.xml><?xml version="1.0" encoding="utf-8"?>
+<p:sld xmlns:a="http://schemas.openxmlformats.org/drawingml/2006/main" xmlns:r="http://schemas.openxmlformats.org/officeDocument/2006/relationships" xmlns:p="http://schemas.openxmlformats.org/presentationml/2006/main">
+  <p:cSld>
+    <p:spTree>
+      <p:nvGrpSpPr>
+        <p:cNvPr id="1" name=""/>
+        <p:cNvGrpSpPr/>
+        <p:nvPr/>
+      </p:nvGrpSpPr>
+      <p:grpSpPr>
+        <a:xfrm>
+          <a:off x="0" y="0"/>
+          <a:ext cx="0" cy="0"/>
+          <a:chOff x="0" y="0"/>
+          <a:chExt cx="0" cy="0"/>
+        </a:xfrm>
+      </p:grpSpPr>
+      <p:sp>
+        <p:nvSpPr>
+          <p:cNvPr id="2" name="Title 1"/>
+          <p:cNvSpPr>
+            <a:spLocks noGrp="1"/>
+          </p:cNvSpPr>
+          <p:nvPr>
+            <p:ph type="title"/>
+          </p:nvPr>
+        </p:nvSpPr>
+        <p:spPr/>
+        <p:txBody>
+          <a:bodyPr/>
+          <a:lstStyle/>
+          <a:p>
+            <a:endParaRPr lang="en-US" dirty="0"/>
+          </a:p>
+        </p:txBody>
+      </p:sp>
+      <p:sp>
+        <p:nvSpPr>
+          <p:cNvPr id="3" name="Content Placeholder 2"/>
+          <p:cNvSpPr>
+            <a:spLocks noGrp="1"/>
+          </p:cNvSpPr>
+          <p:nvPr>
+            <p:ph idx="1"/>
+          </p:nvPr>
+        </p:nvSpPr>
+        <p:spPr>
+          <a:xfrm>
+            <a:off x="7102258" y="2133600"/>
+            <a:ext cx="4402354" cy="3777622"/>
+          </a:xfrm>
+        </p:spPr>
+        <p:txBody>
+          <a:bodyPr/>
+          <a:lstStyle/>
+          <a:p>
+            <a:r>
+              <a:rPr lang="en-US" dirty="0" smtClean="0">
+                <a:latin typeface="Apple Chancery" charset="0"/>
+                <a:ea typeface="Apple Chancery" charset="0"/>
+                <a:cs typeface="Apple Chancery" charset="0"/>
+              </a:rPr>
+              <a:t>Global warming is real!</a:t>
+            </a:r>
+          </a:p>
+          <a:p>
+            <a:r>
+              <a:rPr lang="en-US" dirty="0" smtClean="0">
+                <a:latin typeface="Apple Chancery" charset="0"/>
+                <a:ea typeface="Apple Chancery" charset="0"/>
+                <a:cs typeface="Apple Chancery" charset="0"/>
+              </a:rPr>
+              <a:t>We cannot take this planet for granted!</a:t>
+            </a:r>
+          </a:p>
+          <a:p>
+            <a:endParaRPr lang="en-US" dirty="0"/>
+          </a:p>
+          <a:p>
+            <a:r>
+              <a:rPr lang="en-US" dirty="0" smtClean="0"/>
+              <a:t>We DO NOT take this project for granted !</a:t>
+            </a:r>
           </a:p>
         </p:txBody>
       </p:sp>
@@ -9303,7 +9995,7 @@
         </p:blipFill>
         <p:spPr>
           <a:xfrm>
-            <a:off x="3729733" y="336434"/>
+            <a:off x="2276714" y="336434"/>
             <a:ext cx="4675418" cy="6233890"/>
           </a:xfrm>
           <a:prstGeom prst="rect">
@@ -9321,6 +10013,9 @@
   <p:clrMapOvr>
     <a:masterClrMapping/>
   </p:clrMapOvr>
+  <p:transition spd="slow">
+    <p:push dir="u"/>
+  </p:transition>
   <p:timing>
     <p:tnLst>
       <p:par>
@@ -9381,7 +10076,12 @@
             <p:ph idx="1"/>
           </p:nvPr>
         </p:nvSpPr>
-        <p:spPr/>
+        <p:spPr>
+          <a:xfrm>
+            <a:off x="2589212" y="1653436"/>
+            <a:ext cx="8915400" cy="4257786"/>
+          </a:xfrm>
+        </p:spPr>
         <p:txBody>
           <a:bodyPr/>
           <a:lstStyle/>
@@ -9445,18 +10145,9 @@
   <p:clrMapOvr>
     <a:masterClrMapping/>
   </p:clrMapOvr>
-  <mc:AlternateContent xmlns:mc="http://schemas.openxmlformats.org/markup-compatibility/2006">
-    <mc:Choice xmlns:p14="http://schemas.microsoft.com/office/powerpoint/2010/main" Requires="p14">
-      <p:transition spd="med" p14:dur="700">
-        <p:fade/>
-      </p:transition>
-    </mc:Choice>
-    <mc:Fallback>
-      <p:transition spd="med">
-        <p:fade/>
-      </p:transition>
-    </mc:Fallback>
-  </mc:AlternateContent>
+  <p:transition spd="slow">
+    <p:push dir="u"/>
+  </p:transition>
   <p:timing>
     <p:tnLst>
       <p:par>
@@ -9517,7 +10208,12 @@
             <p:ph idx="1"/>
           </p:nvPr>
         </p:nvSpPr>
-        <p:spPr/>
+        <p:spPr>
+          <a:xfrm>
+            <a:off x="2589212" y="1741118"/>
+            <a:ext cx="8915400" cy="4207682"/>
+          </a:xfrm>
+        </p:spPr>
         <p:txBody>
           <a:bodyPr/>
           <a:lstStyle/>
@@ -9570,30 +10266,28 @@
             <a:pPr lvl="1"/>
             <a:r>
               <a:rPr lang="en-US" dirty="0" smtClean="0"/>
-              <a:t>Track user </a:t>
-            </a:r>
-            <a:r>
-              <a:rPr lang="en-US" dirty="0" err="1" smtClean="0"/>
-              <a:t>behaviour</a:t>
-            </a:r>
-            <a:r>
-              <a:rPr lang="en-US" dirty="0" smtClean="0"/>
-              <a:t> using browser events</a:t>
-            </a:r>
+              <a:t>Track user behavior using browser events for capturing </a:t>
+            </a:r>
+            <a:r>
+              <a:rPr lang="en-US" dirty="0" smtClean="0"/>
+              <a:t>reading time, etc.</a:t>
+            </a:r>
+            <a:endParaRPr lang="en-US" dirty="0" smtClean="0"/>
           </a:p>
           <a:p>
             <a:pPr lvl="1"/>
             <a:r>
               <a:rPr lang="en-US" dirty="0" smtClean="0"/>
-              <a:t>Content presentation based on group traffic</a:t>
+              <a:t>Content presentation based on group traffic and usefulness</a:t>
             </a:r>
           </a:p>
           <a:p>
             <a:pPr lvl="1"/>
             <a:r>
               <a:rPr lang="en-US" dirty="0" smtClean="0"/>
-              <a:t>Link adaptation based on user expertise</a:t>
-            </a:r>
+              <a:t>Link adaptation – Visually distinguish between links based on expertise</a:t>
+            </a:r>
+            <a:endParaRPr lang="en-US" dirty="0" smtClean="0"/>
           </a:p>
           <a:p>
             <a:pPr lvl="1"/>
@@ -9615,13 +10309,13 @@
   <p:clrMapOvr>
     <a:masterClrMapping/>
   </p:clrMapOvr>
-  <mc:AlternateContent xmlns:mc="http://schemas.openxmlformats.org/markup-compatibility/2006">
-    <mc:Choice xmlns:p14="http://schemas.microsoft.com/office/powerpoint/2010/main" Requires="p14">
+  <mc:AlternateContent xmlns:mc="http://schemas.openxmlformats.org/markup-compatibility/2006" xmlns:p14="http://schemas.microsoft.com/office/powerpoint/2010/main">
+    <mc:Choice Requires="p14">
       <p:transition spd="med" p14:dur="700">
         <p:fade/>
       </p:transition>
     </mc:Choice>
-    <mc:Fallback>
+    <mc:Fallback xmlns="">
       <p:transition spd="med">
         <p:fade/>
       </p:transition>
@@ -9669,76 +10363,299 @@
           <a:bodyPr/>
           <a:lstStyle/>
           <a:p>
-            <a:r>
-              <a:rPr lang="en-US" dirty="0" smtClean="0"/>
-              <a:t>Content Model</a:t>
-            </a:r>
-            <a:endParaRPr lang="en-US" dirty="0"/>
-          </a:p>
-        </p:txBody>
-      </p:sp>
-      <p:sp>
-        <p:nvSpPr>
-          <p:cNvPr id="3" name="Content Placeholder 2"/>
-          <p:cNvSpPr>
-            <a:spLocks noGrp="1"/>
-          </p:cNvSpPr>
+            <a:endParaRPr lang="en-IN"/>
+          </a:p>
+        </p:txBody>
+      </p:sp>
+      <p:pic>
+        <p:nvPicPr>
+          <p:cNvPr id="4" name="Content Placeholder 3"/>
+          <p:cNvPicPr>
+            <a:picLocks noGrp="1" noChangeAspect="1"/>
+          </p:cNvPicPr>
           <p:nvPr>
             <p:ph idx="1"/>
           </p:nvPr>
-        </p:nvSpPr>
-        <p:spPr/>
-        <p:txBody>
-          <a:bodyPr/>
-          <a:lstStyle/>
-          <a:p>
-            <a:r>
-              <a:rPr lang="en-US" dirty="0"/>
-              <a:t>Questions, Answers, Comments, Votes, Score</a:t>
-            </a:r>
-          </a:p>
-          <a:p>
-            <a:endParaRPr lang="en-US" dirty="0" smtClean="0"/>
-          </a:p>
-          <a:p>
-            <a:r>
-              <a:rPr lang="en-US" dirty="0" smtClean="0"/>
-              <a:t>Identify Java topics and build concept map</a:t>
-            </a:r>
-          </a:p>
-          <a:p>
-            <a:pPr lvl="1"/>
-            <a:endParaRPr lang="en-US" dirty="0" smtClean="0"/>
-          </a:p>
-          <a:p>
-            <a:r>
-              <a:rPr lang="en-US" dirty="0" smtClean="0"/>
-              <a:t>Cluster posts into one or more topics</a:t>
-            </a:r>
-          </a:p>
-          <a:p>
-            <a:pPr lvl="1"/>
-            <a:r>
-              <a:rPr lang="en-US" dirty="0" smtClean="0"/>
-              <a:t>K-means clustering</a:t>
-            </a:r>
-          </a:p>
-          <a:p>
-            <a:pPr lvl="1"/>
-            <a:r>
-              <a:rPr lang="en-US" dirty="0" smtClean="0"/>
-              <a:t>Keyword extraction</a:t>
-            </a:r>
-          </a:p>
-          <a:p>
-            <a:endParaRPr lang="en-US" dirty="0"/>
-          </a:p>
-        </p:txBody>
-      </p:sp>
+        </p:nvPicPr>
+        <p:blipFill>
+          <a:blip r:embed="rId2">
+            <a:extLst>
+              <a:ext uri="{28A0092B-C50C-407E-A947-70E740481C1C}">
+                <a14:useLocalDpi xmlns:a14="http://schemas.microsoft.com/office/drawing/2010/main" val="0"/>
+              </a:ext>
+            </a:extLst>
+          </a:blip>
+          <a:stretch>
+            <a:fillRect/>
+          </a:stretch>
+        </p:blipFill>
+        <p:spPr>
+          <a:xfrm>
+            <a:off x="2435270" y="198441"/>
+            <a:ext cx="8411406" cy="6031022"/>
+          </a:xfrm>
+        </p:spPr>
+      </p:pic>
     </p:spTree>
     <p:extLst>
       <p:ext uri="{BB962C8B-B14F-4D97-AF65-F5344CB8AC3E}">
-        <p14:creationId xmlns:p14="http://schemas.microsoft.com/office/powerpoint/2010/main" val="1141616124"/>
+        <p14:creationId xmlns:p14="http://schemas.microsoft.com/office/powerpoint/2010/main" val="832598345"/>
+      </p:ext>
+    </p:extLst>
+  </p:cSld>
+  <p:clrMapOvr>
+    <a:masterClrMapping/>
+  </p:clrMapOvr>
+  <p:timing>
+    <p:tnLst>
+      <p:par>
+        <p:cTn id="1" dur="indefinite" restart="never" nodeType="tmRoot"/>
+      </p:par>
+    </p:tnLst>
+  </p:timing>
+</p:sld>
+</file>
+
+<file path=ppt/slides/slide5.xml><?xml version="1.0" encoding="utf-8"?>
+<p:sld xmlns:a="http://schemas.openxmlformats.org/drawingml/2006/main" xmlns:r="http://schemas.openxmlformats.org/officeDocument/2006/relationships" xmlns:p="http://schemas.openxmlformats.org/presentationml/2006/main">
+  <p:cSld>
+    <p:spTree>
+      <p:nvGrpSpPr>
+        <p:cNvPr id="1" name=""/>
+        <p:cNvGrpSpPr/>
+        <p:nvPr/>
+      </p:nvGrpSpPr>
+      <p:grpSpPr>
+        <a:xfrm>
+          <a:off x="0" y="0"/>
+          <a:ext cx="0" cy="0"/>
+          <a:chOff x="0" y="0"/>
+          <a:chExt cx="0" cy="0"/>
+        </a:xfrm>
+      </p:grpSpPr>
+      <p:sp>
+        <p:nvSpPr>
+          <p:cNvPr id="2" name="Title 1"/>
+          <p:cNvSpPr>
+            <a:spLocks noGrp="1"/>
+          </p:cNvSpPr>
+          <p:nvPr>
+            <p:ph type="title"/>
+          </p:nvPr>
+        </p:nvSpPr>
+        <p:spPr/>
+        <p:txBody>
+          <a:bodyPr/>
+          <a:lstStyle/>
+          <a:p>
+            <a:endParaRPr lang="en-IN"/>
+          </a:p>
+        </p:txBody>
+      </p:sp>
+      <p:pic>
+        <p:nvPicPr>
+          <p:cNvPr id="4" name="Content Placeholder 3"/>
+          <p:cNvPicPr>
+            <a:picLocks noGrp="1" noChangeAspect="1"/>
+          </p:cNvPicPr>
+          <p:nvPr>
+            <p:ph idx="1"/>
+          </p:nvPr>
+        </p:nvPicPr>
+        <p:blipFill>
+          <a:blip r:embed="rId2">
+            <a:extLst>
+              <a:ext uri="{28A0092B-C50C-407E-A947-70E740481C1C}">
+                <a14:useLocalDpi xmlns:a14="http://schemas.microsoft.com/office/drawing/2010/main" val="0"/>
+              </a:ext>
+            </a:extLst>
+          </a:blip>
+          <a:stretch>
+            <a:fillRect/>
+          </a:stretch>
+        </p:blipFill>
+        <p:spPr>
+          <a:xfrm>
+            <a:off x="2004257" y="283779"/>
+            <a:ext cx="8883143" cy="5880537"/>
+          </a:xfrm>
+        </p:spPr>
+      </p:pic>
+    </p:spTree>
+    <p:extLst>
+      <p:ext uri="{BB962C8B-B14F-4D97-AF65-F5344CB8AC3E}">
+        <p14:creationId xmlns:p14="http://schemas.microsoft.com/office/powerpoint/2010/main" val="2082622291"/>
+      </p:ext>
+    </p:extLst>
+  </p:cSld>
+  <p:clrMapOvr>
+    <a:masterClrMapping/>
+  </p:clrMapOvr>
+  <p:timing>
+    <p:tnLst>
+      <p:par>
+        <p:cTn id="1" dur="indefinite" restart="never" nodeType="tmRoot"/>
+      </p:par>
+    </p:tnLst>
+  </p:timing>
+</p:sld>
+</file>
+
+<file path=ppt/slides/slide6.xml><?xml version="1.0" encoding="utf-8"?>
+<p:sld xmlns:a="http://schemas.openxmlformats.org/drawingml/2006/main" xmlns:r="http://schemas.openxmlformats.org/officeDocument/2006/relationships" xmlns:p="http://schemas.openxmlformats.org/presentationml/2006/main">
+  <p:cSld>
+    <p:spTree>
+      <p:nvGrpSpPr>
+        <p:cNvPr id="1" name=""/>
+        <p:cNvGrpSpPr/>
+        <p:nvPr/>
+      </p:nvGrpSpPr>
+      <p:grpSpPr>
+        <a:xfrm>
+          <a:off x="0" y="0"/>
+          <a:ext cx="0" cy="0"/>
+          <a:chOff x="0" y="0"/>
+          <a:chExt cx="0" cy="0"/>
+        </a:xfrm>
+      </p:grpSpPr>
+      <p:sp>
+        <p:nvSpPr>
+          <p:cNvPr id="2" name="Title 1"/>
+          <p:cNvSpPr>
+            <a:spLocks noGrp="1"/>
+          </p:cNvSpPr>
+          <p:nvPr>
+            <p:ph type="title"/>
+          </p:nvPr>
+        </p:nvSpPr>
+        <p:spPr/>
+        <p:txBody>
+          <a:bodyPr/>
+          <a:lstStyle/>
+          <a:p>
+            <a:r>
+              <a:rPr lang="en-US" dirty="0" smtClean="0"/>
+              <a:t>Goal – Enhancing usability</a:t>
+            </a:r>
+            <a:endParaRPr lang="en-US" dirty="0"/>
+          </a:p>
+        </p:txBody>
+      </p:sp>
+      <p:sp>
+        <p:nvSpPr>
+          <p:cNvPr id="3" name="Content Placeholder 2"/>
+          <p:cNvSpPr>
+            <a:spLocks noGrp="1"/>
+          </p:cNvSpPr>
+          <p:nvPr>
+            <p:ph idx="1"/>
+          </p:nvPr>
+        </p:nvSpPr>
+        <p:spPr>
+          <a:xfrm>
+            <a:off x="2589212" y="1816274"/>
+            <a:ext cx="8915400" cy="4120000"/>
+          </a:xfrm>
+        </p:spPr>
+        <p:txBody>
+          <a:bodyPr>
+            <a:normAutofit/>
+          </a:bodyPr>
+          <a:lstStyle/>
+          <a:p>
+            <a:r>
+              <a:rPr lang="en-US" dirty="0" smtClean="0"/>
+              <a:t>Drawbacks in </a:t>
+            </a:r>
+            <a:r>
+              <a:rPr lang="en-US" dirty="0" err="1" smtClean="0"/>
+              <a:t>StackOverflow</a:t>
+            </a:r>
+            <a:r>
+              <a:rPr lang="en-US" dirty="0" smtClean="0"/>
+              <a:t> – </a:t>
+            </a:r>
+          </a:p>
+          <a:p>
+            <a:pPr lvl="1"/>
+            <a:r>
+              <a:rPr lang="en-US" dirty="0" smtClean="0"/>
+              <a:t>Content displayed is not adaptive enough</a:t>
+            </a:r>
+          </a:p>
+          <a:p>
+            <a:pPr lvl="1"/>
+            <a:r>
+              <a:rPr lang="en-US" dirty="0" smtClean="0"/>
+              <a:t>Not social </a:t>
+            </a:r>
+          </a:p>
+          <a:p>
+            <a:pPr lvl="1"/>
+            <a:r>
+              <a:rPr lang="en-US" dirty="0" smtClean="0"/>
+              <a:t>Does not represent usefulness of links</a:t>
+            </a:r>
+          </a:p>
+          <a:p>
+            <a:pPr lvl="1"/>
+            <a:endParaRPr lang="en-US" dirty="0"/>
+          </a:p>
+          <a:p>
+            <a:r>
+              <a:rPr lang="en-US" dirty="0" smtClean="0"/>
+              <a:t>Solution: Java with the Flow!</a:t>
+            </a:r>
+          </a:p>
+          <a:p>
+            <a:pPr lvl="1"/>
+            <a:r>
+              <a:rPr lang="en-US" dirty="0" smtClean="0"/>
+              <a:t>Track user behavior using browser events for </a:t>
+            </a:r>
+            <a:r>
+              <a:rPr lang="en-US" dirty="0" smtClean="0"/>
+              <a:t>capturing </a:t>
+            </a:r>
+            <a:r>
+              <a:rPr lang="en-US" dirty="0"/>
+              <a:t>reading time, etc</a:t>
+            </a:r>
+            <a:r>
+              <a:rPr lang="en-US" dirty="0" smtClean="0"/>
+              <a:t>.</a:t>
+            </a:r>
+            <a:endParaRPr lang="en-US" dirty="0" smtClean="0"/>
+          </a:p>
+          <a:p>
+            <a:pPr lvl="1"/>
+            <a:r>
+              <a:rPr lang="en-US" dirty="0" smtClean="0"/>
+              <a:t>Content presentation based on group traffic and usefulness</a:t>
+            </a:r>
+          </a:p>
+          <a:p>
+            <a:pPr lvl="1"/>
+            <a:r>
+              <a:rPr lang="en-US" dirty="0" smtClean="0"/>
+              <a:t>Link adaptation – Visually distinguish between links based on expertise</a:t>
+            </a:r>
+            <a:endParaRPr lang="en-US" dirty="0" smtClean="0"/>
+          </a:p>
+          <a:p>
+            <a:pPr lvl="1"/>
+            <a:endParaRPr lang="en-US" dirty="0" smtClean="0"/>
+          </a:p>
+          <a:p>
+            <a:pPr lvl="1"/>
+            <a:endParaRPr lang="en-US" dirty="0"/>
+          </a:p>
+        </p:txBody>
+      </p:sp>
+    </p:spTree>
+    <p:extLst>
+      <p:ext uri="{BB962C8B-B14F-4D97-AF65-F5344CB8AC3E}">
+        <p14:creationId xmlns:p14="http://schemas.microsoft.com/office/powerpoint/2010/main" val="1389665131"/>
       </p:ext>
     </p:extLst>
   </p:cSld>
@@ -9767,309 +10684,6 @@
 </p:sld>
 </file>
 
-<file path=ppt/slides/slide5.xml><?xml version="1.0" encoding="utf-8"?>
-<p:sld xmlns:a="http://schemas.openxmlformats.org/drawingml/2006/main" xmlns:r="http://schemas.openxmlformats.org/officeDocument/2006/relationships" xmlns:p="http://schemas.openxmlformats.org/presentationml/2006/main">
-  <p:cSld>
-    <p:spTree>
-      <p:nvGrpSpPr>
-        <p:cNvPr id="1" name=""/>
-        <p:cNvGrpSpPr/>
-        <p:nvPr/>
-      </p:nvGrpSpPr>
-      <p:grpSpPr>
-        <a:xfrm>
-          <a:off x="0" y="0"/>
-          <a:ext cx="0" cy="0"/>
-          <a:chOff x="0" y="0"/>
-          <a:chExt cx="0" cy="0"/>
-        </a:xfrm>
-      </p:grpSpPr>
-      <p:sp>
-        <p:nvSpPr>
-          <p:cNvPr id="2" name="Title 1"/>
-          <p:cNvSpPr>
-            <a:spLocks noGrp="1"/>
-          </p:cNvSpPr>
-          <p:nvPr>
-            <p:ph type="title"/>
-          </p:nvPr>
-        </p:nvSpPr>
-        <p:spPr/>
-        <p:txBody>
-          <a:bodyPr/>
-          <a:lstStyle/>
-          <a:p>
-            <a:r>
-              <a:rPr lang="en-US" dirty="0" smtClean="0"/>
-              <a:t>User Model</a:t>
-            </a:r>
-            <a:endParaRPr lang="en-US" dirty="0"/>
-          </a:p>
-        </p:txBody>
-      </p:sp>
-      <p:sp>
-        <p:nvSpPr>
-          <p:cNvPr id="3" name="Content Placeholder 2"/>
-          <p:cNvSpPr>
-            <a:spLocks noGrp="1"/>
-          </p:cNvSpPr>
-          <p:nvPr>
-            <p:ph idx="1"/>
-          </p:nvPr>
-        </p:nvSpPr>
-        <p:spPr/>
-        <p:txBody>
-          <a:bodyPr/>
-          <a:lstStyle/>
-          <a:p>
-            <a:r>
-              <a:rPr lang="en-US" dirty="0" smtClean="0"/>
-              <a:t>Interests</a:t>
-            </a:r>
-          </a:p>
-          <a:p>
-            <a:r>
-              <a:rPr lang="en-US" dirty="0" smtClean="0"/>
-              <a:t>Voting </a:t>
-            </a:r>
-            <a:r>
-              <a:rPr lang="en-US" dirty="0" err="1" smtClean="0"/>
-              <a:t>behaviour</a:t>
-            </a:r>
-            <a:endParaRPr lang="en-US" dirty="0" smtClean="0"/>
-          </a:p>
-          <a:p>
-            <a:r>
-              <a:rPr lang="en-US" dirty="0" smtClean="0"/>
-              <a:t>Following </a:t>
-            </a:r>
-          </a:p>
-          <a:p>
-            <a:r>
-              <a:rPr lang="en-US" dirty="0" smtClean="0"/>
-              <a:t>Expertise</a:t>
-            </a:r>
-            <a:endParaRPr lang="en-US" dirty="0"/>
-          </a:p>
-          <a:p>
-            <a:pPr lvl="1"/>
-            <a:r>
-              <a:rPr lang="en-US" dirty="0" smtClean="0"/>
-              <a:t>For a new user, gather interests explicitly and assign threshold score</a:t>
-            </a:r>
-          </a:p>
-          <a:p>
-            <a:pPr lvl="1"/>
-            <a:r>
-              <a:rPr lang="en-US" dirty="0" smtClean="0"/>
-              <a:t>Update score based on user’s interaction with the system</a:t>
-            </a:r>
-          </a:p>
-          <a:p>
-            <a:pPr lvl="1"/>
-            <a:endParaRPr lang="en-US" dirty="0" smtClean="0"/>
-          </a:p>
-          <a:p>
-            <a:pPr lvl="1"/>
-            <a:endParaRPr lang="en-US" dirty="0"/>
-          </a:p>
-        </p:txBody>
-      </p:sp>
-    </p:spTree>
-    <p:extLst>
-      <p:ext uri="{BB962C8B-B14F-4D97-AF65-F5344CB8AC3E}">
-        <p14:creationId xmlns:p14="http://schemas.microsoft.com/office/powerpoint/2010/main" val="608413784"/>
-      </p:ext>
-    </p:extLst>
-  </p:cSld>
-  <p:clrMapOvr>
-    <a:masterClrMapping/>
-  </p:clrMapOvr>
-  <mc:AlternateContent xmlns:mc="http://schemas.openxmlformats.org/markup-compatibility/2006">
-    <mc:Choice xmlns:p14="http://schemas.microsoft.com/office/powerpoint/2010/main" Requires="p14">
-      <p:transition spd="med" p14:dur="700">
-        <p:fade/>
-      </p:transition>
-    </mc:Choice>
-    <mc:Fallback>
-      <p:transition spd="med">
-        <p:fade/>
-      </p:transition>
-    </mc:Fallback>
-  </mc:AlternateContent>
-  <p:timing>
-    <p:tnLst>
-      <p:par>
-        <p:cTn id="1" dur="indefinite" restart="never" nodeType="tmRoot"/>
-      </p:par>
-    </p:tnLst>
-  </p:timing>
-</p:sld>
-</file>
-
-<file path=ppt/slides/slide6.xml><?xml version="1.0" encoding="utf-8"?>
-<p:sld xmlns:a="http://schemas.openxmlformats.org/drawingml/2006/main" xmlns:r="http://schemas.openxmlformats.org/officeDocument/2006/relationships" xmlns:p="http://schemas.openxmlformats.org/presentationml/2006/main">
-  <p:cSld>
-    <p:spTree>
-      <p:nvGrpSpPr>
-        <p:cNvPr id="1" name=""/>
-        <p:cNvGrpSpPr/>
-        <p:nvPr/>
-      </p:nvGrpSpPr>
-      <p:grpSpPr>
-        <a:xfrm>
-          <a:off x="0" y="0"/>
-          <a:ext cx="0" cy="0"/>
-          <a:chOff x="0" y="0"/>
-          <a:chExt cx="0" cy="0"/>
-        </a:xfrm>
-      </p:grpSpPr>
-      <p:sp>
-        <p:nvSpPr>
-          <p:cNvPr id="2" name="Title 1"/>
-          <p:cNvSpPr>
-            <a:spLocks noGrp="1"/>
-          </p:cNvSpPr>
-          <p:nvPr>
-            <p:ph type="title"/>
-          </p:nvPr>
-        </p:nvSpPr>
-        <p:spPr/>
-        <p:txBody>
-          <a:bodyPr/>
-          <a:lstStyle/>
-          <a:p>
-            <a:r>
-              <a:rPr lang="en-US" dirty="0" smtClean="0"/>
-              <a:t>Adaptation</a:t>
-            </a:r>
-            <a:endParaRPr lang="en-US" dirty="0"/>
-          </a:p>
-        </p:txBody>
-      </p:sp>
-      <p:sp>
-        <p:nvSpPr>
-          <p:cNvPr id="3" name="Content Placeholder 2"/>
-          <p:cNvSpPr>
-            <a:spLocks noGrp="1"/>
-          </p:cNvSpPr>
-          <p:nvPr>
-            <p:ph idx="1"/>
-          </p:nvPr>
-        </p:nvSpPr>
-        <p:spPr/>
-        <p:txBody>
-          <a:bodyPr>
-            <a:normAutofit fontScale="92500" lnSpcReduction="10000"/>
-          </a:bodyPr>
-          <a:lstStyle/>
-          <a:p>
-            <a:r>
-              <a:rPr lang="en-US" dirty="0" smtClean="0"/>
-              <a:t>Explicit</a:t>
-            </a:r>
-          </a:p>
-          <a:p>
-            <a:pPr lvl="1"/>
-            <a:r>
-              <a:rPr lang="en-US" dirty="0" smtClean="0"/>
-              <a:t>Group Traffic </a:t>
-            </a:r>
-          </a:p>
-          <a:p>
-            <a:pPr lvl="1"/>
-            <a:r>
-              <a:rPr lang="en-US" dirty="0" smtClean="0"/>
-              <a:t>Usefulness rating</a:t>
-            </a:r>
-          </a:p>
-          <a:p>
-            <a:endParaRPr lang="en-US" dirty="0" smtClean="0"/>
-          </a:p>
-          <a:p>
-            <a:r>
-              <a:rPr lang="en-US" dirty="0" smtClean="0"/>
-              <a:t>Implicit</a:t>
-            </a:r>
-          </a:p>
-          <a:p>
-            <a:pPr lvl="1"/>
-            <a:r>
-              <a:rPr lang="en-US" dirty="0" smtClean="0"/>
-              <a:t>User Interests</a:t>
-            </a:r>
-          </a:p>
-          <a:p>
-            <a:pPr lvl="1"/>
-            <a:r>
-              <a:rPr lang="en-US" dirty="0" smtClean="0"/>
-              <a:t>User Expertise</a:t>
-            </a:r>
-          </a:p>
-          <a:p>
-            <a:pPr lvl="1"/>
-            <a:r>
-              <a:rPr lang="en-US" dirty="0" smtClean="0"/>
-              <a:t>Followers’ answers</a:t>
-            </a:r>
-          </a:p>
-          <a:p>
-            <a:pPr lvl="1"/>
-            <a:r>
-              <a:rPr lang="en-US" dirty="0" smtClean="0"/>
-              <a:t>Usefulness </a:t>
-            </a:r>
-          </a:p>
-          <a:p>
-            <a:pPr lvl="2"/>
-            <a:r>
-              <a:rPr lang="en-US" dirty="0"/>
-              <a:t>S</a:t>
-            </a:r>
-            <a:r>
-              <a:rPr lang="en-US" dirty="0" smtClean="0"/>
-              <a:t>entiment analysis of comments</a:t>
-            </a:r>
-          </a:p>
-          <a:p>
-            <a:pPr lvl="2"/>
-            <a:r>
-              <a:rPr lang="en-US" dirty="0" smtClean="0"/>
-              <a:t>Browser events on the post</a:t>
-            </a:r>
-          </a:p>
-          <a:p>
-            <a:pPr lvl="1"/>
-            <a:endParaRPr lang="en-US" dirty="0" smtClean="0"/>
-          </a:p>
-          <a:p>
-            <a:pPr marL="0" indent="0">
-              <a:buNone/>
-            </a:pPr>
-            <a:endParaRPr lang="en-US" dirty="0"/>
-          </a:p>
-        </p:txBody>
-      </p:sp>
-    </p:spTree>
-    <p:extLst>
-      <p:ext uri="{BB962C8B-B14F-4D97-AF65-F5344CB8AC3E}">
-        <p14:creationId xmlns:p14="http://schemas.microsoft.com/office/powerpoint/2010/main" val="910450857"/>
-      </p:ext>
-    </p:extLst>
-  </p:cSld>
-  <p:clrMapOvr>
-    <a:masterClrMapping/>
-  </p:clrMapOvr>
-  <p:timing>
-    <p:tnLst>
-      <p:par>
-        <p:cTn id="1" dur="indefinite" restart="never" nodeType="tmRoot"/>
-      </p:par>
-    </p:tnLst>
-  </p:timing>
-</p:sld>
-</file>
-
 <file path=ppt/slides/slide7.xml><?xml version="1.0" encoding="utf-8"?>
 <p:sld xmlns:a="http://schemas.openxmlformats.org/drawingml/2006/main" xmlns:r="http://schemas.openxmlformats.org/officeDocument/2006/relationships" xmlns:p="http://schemas.openxmlformats.org/presentationml/2006/main">
   <p:cSld>
@@ -10104,7 +10718,7 @@
           <a:p>
             <a:r>
               <a:rPr lang="en-US" dirty="0" smtClean="0"/>
-              <a:t>System Interactions</a:t>
+              <a:t>Content Model</a:t>
             </a:r>
             <a:endParaRPr lang="en-US" dirty="0"/>
           </a:p>
@@ -10127,62 +10741,75 @@
           <a:p>
             <a:r>
               <a:rPr lang="en-US" dirty="0" smtClean="0"/>
-              <a:t>Ask questions, Answer questions, Comment</a:t>
-            </a:r>
-          </a:p>
-          <a:p>
-            <a:r>
-              <a:rPr lang="en-US" dirty="0" smtClean="0"/>
-              <a:t>Update preferences </a:t>
-            </a:r>
-          </a:p>
-          <a:p>
-            <a:r>
-              <a:rPr lang="en-US" dirty="0" smtClean="0"/>
-              <a:t>Rate usefulness of posts and answers</a:t>
-            </a:r>
-          </a:p>
-          <a:p>
-            <a:r>
-              <a:rPr lang="en-US" dirty="0" smtClean="0"/>
-              <a:t>Bookmark posts</a:t>
-            </a:r>
-          </a:p>
-          <a:p>
-            <a:r>
-              <a:rPr lang="en-US" dirty="0" smtClean="0"/>
-              <a:t>Search</a:t>
-            </a:r>
-          </a:p>
-          <a:p>
+              <a:t>From </a:t>
+            </a:r>
+            <a:r>
+              <a:rPr lang="en-US" dirty="0" err="1" smtClean="0"/>
+              <a:t>StackOverflow</a:t>
+            </a:r>
+            <a:r>
+              <a:rPr lang="en-US" dirty="0" smtClean="0"/>
+              <a:t>: </a:t>
+            </a:r>
+            <a:r>
+              <a:rPr lang="en-US" dirty="0" smtClean="0"/>
+              <a:t>Questions</a:t>
+            </a:r>
             <a:r>
               <a:rPr lang="en-US" dirty="0"/>
-              <a:t>Follow </a:t>
-            </a:r>
-            <a:r>
-              <a:rPr lang="en-US" dirty="0" smtClean="0"/>
-              <a:t>users</a:t>
-            </a:r>
-          </a:p>
-          <a:p>
-            <a:pPr marL="0" indent="0">
-              <a:buNone/>
-            </a:pPr>
-            <a:endParaRPr lang="en-US" dirty="0"/>
-          </a:p>
-          <a:p>
+              <a:t>, Answers, Comments, </a:t>
+            </a:r>
+            <a:r>
+              <a:rPr lang="en-US" dirty="0" smtClean="0"/>
+              <a:t>Votes </a:t>
+            </a:r>
+          </a:p>
+          <a:p>
+            <a:r>
+              <a:rPr lang="en-US" dirty="0" smtClean="0"/>
+              <a:t>Score</a:t>
+            </a:r>
+            <a:r>
+              <a:rPr lang="en-US" dirty="0" smtClean="0"/>
+              <a:t>, based on votes, usefulness, answers, views</a:t>
+            </a:r>
+          </a:p>
+          <a:p>
+            <a:r>
+              <a:rPr lang="en-US" dirty="0" smtClean="0"/>
+              <a:t>Identify Java topics and build concept </a:t>
+            </a:r>
+            <a:r>
+              <a:rPr lang="en-US" dirty="0" smtClean="0"/>
+              <a:t>map that represents the relationship between topics</a:t>
+            </a:r>
             <a:endParaRPr lang="en-US" dirty="0" smtClean="0"/>
           </a:p>
           <a:p>
+            <a:pPr lvl="1"/>
             <a:endParaRPr lang="en-US" dirty="0" smtClean="0"/>
           </a:p>
           <a:p>
-            <a:endParaRPr lang="en-US" dirty="0" smtClean="0"/>
-          </a:p>
-          <a:p>
-            <a:pPr marL="457200" lvl="1" indent="0">
-              <a:buNone/>
-            </a:pPr>
+            <a:r>
+              <a:rPr lang="en-US" dirty="0" smtClean="0"/>
+              <a:t>Cluster posts into one or more topics</a:t>
+            </a:r>
+          </a:p>
+          <a:p>
+            <a:pPr lvl="1"/>
+            <a:r>
+              <a:rPr lang="en-US" dirty="0" smtClean="0"/>
+              <a:t>K-means clustering</a:t>
+            </a:r>
+          </a:p>
+          <a:p>
+            <a:pPr lvl="1"/>
+            <a:r>
+              <a:rPr lang="en-US" dirty="0" smtClean="0"/>
+              <a:t>Keyword extraction</a:t>
+            </a:r>
+          </a:p>
+          <a:p>
             <a:endParaRPr lang="en-US" dirty="0"/>
           </a:p>
         </p:txBody>
@@ -10190,13 +10817,25 @@
     </p:spTree>
     <p:extLst>
       <p:ext uri="{BB962C8B-B14F-4D97-AF65-F5344CB8AC3E}">
-        <p14:creationId xmlns:p14="http://schemas.microsoft.com/office/powerpoint/2010/main" val="2081572601"/>
+        <p14:creationId xmlns:p14="http://schemas.microsoft.com/office/powerpoint/2010/main" val="1141616124"/>
       </p:ext>
     </p:extLst>
   </p:cSld>
   <p:clrMapOvr>
     <a:masterClrMapping/>
   </p:clrMapOvr>
+  <mc:AlternateContent xmlns:mc="http://schemas.openxmlformats.org/markup-compatibility/2006" xmlns:p14="http://schemas.microsoft.com/office/powerpoint/2010/main">
+    <mc:Choice Requires="p14">
+      <p:transition spd="med" p14:dur="700">
+        <p:fade/>
+      </p:transition>
+    </mc:Choice>
+    <mc:Fallback xmlns="">
+      <p:transition spd="med">
+        <p:fade/>
+      </p:transition>
+    </mc:Fallback>
+  </mc:AlternateContent>
   <p:timing>
     <p:tnLst>
       <p:par>
@@ -10241,7 +10880,7 @@
           <a:p>
             <a:r>
               <a:rPr lang="en-US" dirty="0" smtClean="0"/>
-              <a:t>Prototype</a:t>
+              <a:t>User Model</a:t>
             </a:r>
             <a:endParaRPr lang="en-US" dirty="0"/>
           </a:p>
@@ -10262,6 +10901,50 @@
           <a:bodyPr/>
           <a:lstStyle/>
           <a:p>
+            <a:r>
+              <a:rPr lang="en-US" dirty="0" smtClean="0"/>
+              <a:t>Interests</a:t>
+            </a:r>
+          </a:p>
+          <a:p>
+            <a:r>
+              <a:rPr lang="en-US" dirty="0" smtClean="0"/>
+              <a:t>Voting behavior</a:t>
+            </a:r>
+          </a:p>
+          <a:p>
+            <a:r>
+              <a:rPr lang="en-US" dirty="0" smtClean="0"/>
+              <a:t>User’s “Following List”</a:t>
+            </a:r>
+          </a:p>
+          <a:p>
+            <a:r>
+              <a:rPr lang="en-US" dirty="0" smtClean="0"/>
+              <a:t>Expertise</a:t>
+            </a:r>
+            <a:endParaRPr lang="en-US" dirty="0"/>
+          </a:p>
+          <a:p>
+            <a:pPr lvl="1"/>
+            <a:r>
+              <a:rPr lang="en-US" dirty="0" smtClean="0"/>
+              <a:t>For a new user, gather interests explicitly and assign threshold score</a:t>
+            </a:r>
+          </a:p>
+          <a:p>
+            <a:pPr lvl="1"/>
+            <a:r>
+              <a:rPr lang="en-US" dirty="0" smtClean="0"/>
+              <a:t>Update score based on user’s interaction with the system</a:t>
+            </a:r>
+          </a:p>
+          <a:p>
+            <a:pPr lvl="1"/>
+            <a:endParaRPr lang="en-US" dirty="0" smtClean="0"/>
+          </a:p>
+          <a:p>
+            <a:pPr lvl="1"/>
             <a:endParaRPr lang="en-US" dirty="0"/>
           </a:p>
         </p:txBody>
@@ -10269,20 +10952,20 @@
     </p:spTree>
     <p:extLst>
       <p:ext uri="{BB962C8B-B14F-4D97-AF65-F5344CB8AC3E}">
-        <p14:creationId xmlns:p14="http://schemas.microsoft.com/office/powerpoint/2010/main" val="709393584"/>
+        <p14:creationId xmlns:p14="http://schemas.microsoft.com/office/powerpoint/2010/main" val="608413784"/>
       </p:ext>
     </p:extLst>
   </p:cSld>
   <p:clrMapOvr>
     <a:masterClrMapping/>
   </p:clrMapOvr>
-  <mc:AlternateContent xmlns:mc="http://schemas.openxmlformats.org/markup-compatibility/2006">
-    <mc:Choice xmlns:p14="http://schemas.microsoft.com/office/powerpoint/2010/main" Requires="p14">
+  <mc:AlternateContent xmlns:mc="http://schemas.openxmlformats.org/markup-compatibility/2006" xmlns:p14="http://schemas.microsoft.com/office/powerpoint/2010/main">
+    <mc:Choice Requires="p14">
       <p:transition spd="med" p14:dur="700">
         <p:fade/>
       </p:transition>
     </mc:Choice>
-    <mc:Fallback>
+    <mc:Fallback xmlns="">
       <p:transition spd="med">
         <p:fade/>
       </p:transition>
@@ -10332,7 +11015,7 @@
           <a:p>
             <a:r>
               <a:rPr lang="en-US" dirty="0" smtClean="0"/>
-              <a:t>Evaluation</a:t>
+              <a:t>Adaptation</a:t>
             </a:r>
             <a:endParaRPr lang="en-US" dirty="0"/>
           </a:p>
@@ -10348,33 +11031,135 @@
             <p:ph idx="1"/>
           </p:nvPr>
         </p:nvSpPr>
-        <p:spPr/>
-        <p:txBody>
-          <a:bodyPr/>
+        <p:spPr>
+          <a:xfrm>
+            <a:off x="2589212" y="1676395"/>
+            <a:ext cx="8915400" cy="4496079"/>
+          </a:xfrm>
+        </p:spPr>
+        <p:txBody>
+          <a:bodyPr>
+            <a:normAutofit fontScale="92500" lnSpcReduction="10000"/>
+          </a:bodyPr>
           <a:lstStyle/>
           <a:p>
             <a:r>
               <a:rPr lang="en-US" dirty="0" smtClean="0"/>
-              <a:t>Design two sets of similar tasks  </a:t>
-            </a:r>
-          </a:p>
-          <a:p>
-            <a:r>
-              <a:rPr lang="en-US" dirty="0" smtClean="0"/>
-              <a:t>Find volunteers to execute the tasks on both existing and new system, alternatively</a:t>
-            </a:r>
-          </a:p>
-          <a:p>
-            <a:r>
-              <a:rPr lang="en-US" dirty="0" smtClean="0"/>
-              <a:t>Compare performance metrics</a:t>
-            </a:r>
-          </a:p>
-          <a:p>
-            <a:r>
-              <a:rPr lang="en-US" dirty="0" smtClean="0"/>
-              <a:t>Collect user feedback on system usability </a:t>
-            </a:r>
+              <a:t>Explicit</a:t>
+            </a:r>
+          </a:p>
+          <a:p>
+            <a:pPr lvl="1"/>
+            <a:r>
+              <a:rPr lang="en-US" dirty="0" smtClean="0"/>
+              <a:t>Group Traffic </a:t>
+            </a:r>
+          </a:p>
+          <a:p>
+            <a:pPr lvl="1"/>
+            <a:r>
+              <a:rPr lang="en-US" dirty="0" smtClean="0"/>
+              <a:t>Usefulness rating</a:t>
+            </a:r>
+          </a:p>
+          <a:p>
+            <a:pPr lvl="1"/>
+            <a:r>
+              <a:rPr lang="en-US" dirty="0" smtClean="0"/>
+              <a:t>Switch mode based on user’s </a:t>
+            </a:r>
+            <a:r>
+              <a:rPr lang="en-US" dirty="0" smtClean="0"/>
+              <a:t>intention</a:t>
+            </a:r>
+          </a:p>
+          <a:p>
+            <a:pPr lvl="2"/>
+            <a:r>
+              <a:rPr lang="en-US" dirty="0" smtClean="0"/>
+              <a:t>Reading spree mode</a:t>
+            </a:r>
+          </a:p>
+          <a:p>
+            <a:pPr lvl="2"/>
+            <a:r>
+              <a:rPr lang="en-US" dirty="0" smtClean="0"/>
+              <a:t>Answer like a pro mode</a:t>
+            </a:r>
+            <a:endParaRPr lang="en-US" dirty="0" smtClean="0"/>
+          </a:p>
+          <a:p>
+            <a:r>
+              <a:rPr lang="en-US" dirty="0" smtClean="0"/>
+              <a:t>Implicit</a:t>
+            </a:r>
+          </a:p>
+          <a:p>
+            <a:pPr lvl="1"/>
+            <a:r>
+              <a:rPr lang="en-US" dirty="0" smtClean="0"/>
+              <a:t>User Interests</a:t>
+            </a:r>
+          </a:p>
+          <a:p>
+            <a:pPr lvl="1"/>
+            <a:r>
+              <a:rPr lang="en-US" dirty="0" smtClean="0"/>
+              <a:t>User Expertise</a:t>
+            </a:r>
+          </a:p>
+          <a:p>
+            <a:pPr lvl="1"/>
+            <a:r>
+              <a:rPr lang="en-US" dirty="0" smtClean="0"/>
+              <a:t>Followers’ answers</a:t>
+            </a:r>
+          </a:p>
+          <a:p>
+            <a:pPr lvl="1"/>
+            <a:r>
+              <a:rPr lang="en-US" dirty="0" smtClean="0"/>
+              <a:t>Usefulness </a:t>
+            </a:r>
+          </a:p>
+          <a:p>
+            <a:pPr lvl="2"/>
+            <a:r>
+              <a:rPr lang="en-US" dirty="0"/>
+              <a:t>S</a:t>
+            </a:r>
+            <a:r>
+              <a:rPr lang="en-US" dirty="0" smtClean="0"/>
+              <a:t>entiment analysis of comments</a:t>
+            </a:r>
+          </a:p>
+          <a:p>
+            <a:pPr lvl="2"/>
+            <a:r>
+              <a:rPr lang="en-US" dirty="0" smtClean="0"/>
+              <a:t>Browser events </a:t>
+            </a:r>
+            <a:r>
+              <a:rPr lang="en-US" dirty="0" smtClean="0"/>
+              <a:t>from </a:t>
+            </a:r>
+            <a:r>
+              <a:rPr lang="en-US" dirty="0" smtClean="0"/>
+              <a:t>the </a:t>
+            </a:r>
+            <a:r>
+              <a:rPr lang="en-US" dirty="0" smtClean="0"/>
+              <a:t>post</a:t>
+            </a:r>
+          </a:p>
+          <a:p>
+            <a:pPr lvl="1"/>
+            <a:endParaRPr lang="en-US" dirty="0" smtClean="0"/>
+          </a:p>
+          <a:p>
+            <a:pPr marL="0" indent="0">
+              <a:buNone/>
+            </a:pPr>
             <a:endParaRPr lang="en-US" dirty="0"/>
           </a:p>
         </p:txBody>
@@ -10382,7 +11167,7 @@
     </p:spTree>
     <p:extLst>
       <p:ext uri="{BB962C8B-B14F-4D97-AF65-F5344CB8AC3E}">
-        <p14:creationId xmlns:p14="http://schemas.microsoft.com/office/powerpoint/2010/main" val="1588279465"/>
+        <p14:creationId xmlns:p14="http://schemas.microsoft.com/office/powerpoint/2010/main" val="910450857"/>
       </p:ext>
     </p:extLst>
   </p:cSld>

</xml_diff>

<commit_message>
db scripts and ppt
</commit_message>
<xml_diff>
--- a/index/ppt/JavaWithTheFlow.pptx
+++ b/index/ppt/JavaWithTheFlow.pptx
@@ -5,7 +5,7 @@
     <p:sldMasterId id="2147483648" r:id="rId1"/>
   </p:sldMasterIdLst>
   <p:notesMasterIdLst>
-    <p:notesMasterId r:id="rId17"/>
+    <p:notesMasterId r:id="rId15"/>
   </p:notesMasterIdLst>
   <p:sldIdLst>
     <p:sldId id="256" r:id="rId2"/>
@@ -20,9 +20,7 @@
     <p:sldId id="272" r:id="rId11"/>
     <p:sldId id="268" r:id="rId12"/>
     <p:sldId id="262" r:id="rId13"/>
-    <p:sldId id="263" r:id="rId14"/>
-    <p:sldId id="271" r:id="rId15"/>
-    <p:sldId id="265" r:id="rId16"/>
+    <p:sldId id="274" r:id="rId14"/>
   </p:sldIdLst>
   <p:sldSz cx="12192000" cy="6858000"/>
   <p:notesSz cx="6858000" cy="9144000"/>
@@ -938,13 +936,54 @@
             </a:r>
           </a:p>
           <a:p>
+            <a:pPr marL="0" indent="0">
+              <a:buNone/>
+            </a:pPr>
+            <a:r>
+              <a:rPr lang="en-US" dirty="0" smtClean="0"/>
+              <a:t>Usefulness rating – individual rating overrides group traffic </a:t>
+            </a:r>
+            <a:r>
+              <a:rPr lang="en-US" dirty="0" smtClean="0"/>
+              <a:t>opinion</a:t>
+            </a:r>
+          </a:p>
+          <a:p>
             <a:pPr marL="228600" indent="-228600">
               <a:buAutoNum type="arabicPeriod"/>
             </a:pPr>
+            <a:endParaRPr lang="en-US" dirty="0" smtClean="0"/>
+          </a:p>
+          <a:p>
+            <a:pPr marL="0" indent="0">
+              <a:buNone/>
+            </a:pPr>
             <a:r>
               <a:rPr lang="en-US" dirty="0" smtClean="0"/>
-              <a:t>Usefulness rating – individual rating overrides group traffic opinion</a:t>
-            </a:r>
+              <a:t>1. For</a:t>
+            </a:r>
+            <a:r>
+              <a:rPr lang="en-US" baseline="0" dirty="0" smtClean="0"/>
+              <a:t> each question, we provide visual cues based </a:t>
+            </a:r>
+            <a:r>
+              <a:rPr lang="en-US" dirty="0" smtClean="0"/>
+              <a:t>on group traffic and usefulness –</a:t>
+            </a:r>
+            <a:r>
+              <a:rPr lang="en-US" baseline="0" dirty="0" smtClean="0"/>
+              <a:t> darker shade indicates higher traffic or usefulness</a:t>
+            </a:r>
+          </a:p>
+          <a:p>
+            <a:pPr marL="0" indent="0">
+              <a:buNone/>
+            </a:pPr>
+            <a:r>
+              <a:rPr lang="en-US" baseline="0" dirty="0" smtClean="0"/>
+              <a:t>2. We also provide options to the user to sort the results by group traffic, usefulness or relevance.</a:t>
+            </a:r>
+            <a:endParaRPr lang="en-US" dirty="0" smtClean="0"/>
           </a:p>
           <a:p>
             <a:pPr marL="228600" indent="-228600">
@@ -1050,11 +1089,91 @@
             </a:r>
           </a:p>
           <a:p>
+            <a:pPr marL="171450" indent="-171450">
+              <a:buFontTx/>
+              <a:buChar char="-"/>
+            </a:pPr>
             <a:r>
               <a:rPr lang="en-US" baseline="0" dirty="0" smtClean="0"/>
-              <a:t>- User ratings for question = aggregate of user ratings of all answers in the question</a:t>
-            </a:r>
-            <a:endParaRPr lang="en-US" dirty="0"/>
+              <a:t>User ratings for question = aggregate of user ratings of all answers in the question</a:t>
+            </a:r>
+          </a:p>
+          <a:p>
+            <a:pPr marL="171450" indent="-171450">
+              <a:buFontTx/>
+              <a:buChar char="-"/>
+            </a:pPr>
+            <a:endParaRPr lang="en-US" baseline="0" dirty="0" smtClean="0"/>
+          </a:p>
+          <a:p>
+            <a:pPr marL="171450" indent="-171450">
+              <a:buFontTx/>
+              <a:buChar char="-"/>
+            </a:pPr>
+            <a:r>
+              <a:rPr lang="en-US" baseline="0" dirty="0" smtClean="0"/>
+              <a:t>Usefulness is calculated based on the following metrics:</a:t>
+            </a:r>
+          </a:p>
+          <a:p>
+            <a:pPr marL="628650" lvl="1" indent="-171450">
+              <a:buFontTx/>
+              <a:buChar char="-"/>
+            </a:pPr>
+            <a:r>
+              <a:rPr lang="en-US" baseline="0" dirty="0" smtClean="0"/>
+              <a:t>User ratings in the form of one of these smileys</a:t>
+            </a:r>
+          </a:p>
+          <a:p>
+            <a:pPr marL="628650" lvl="1" indent="-171450">
+              <a:buFontTx/>
+              <a:buChar char="-"/>
+            </a:pPr>
+            <a:r>
+              <a:rPr lang="en-US" baseline="0" dirty="0" smtClean="0"/>
+              <a:t>Average time spent by users on the post</a:t>
+            </a:r>
+          </a:p>
+          <a:p>
+            <a:pPr marL="628650" lvl="1" indent="-171450">
+              <a:buFontTx/>
+              <a:buChar char="-"/>
+            </a:pPr>
+            <a:r>
+              <a:rPr lang="en-US" baseline="0" dirty="0" smtClean="0"/>
+              <a:t>Number of select operations performed by users on the post</a:t>
+            </a:r>
+          </a:p>
+          <a:p>
+            <a:pPr marL="628650" lvl="1" indent="-171450">
+              <a:buFontTx/>
+              <a:buChar char="-"/>
+            </a:pPr>
+            <a:r>
+              <a:rPr lang="en-US" baseline="0" dirty="0" smtClean="0"/>
+              <a:t>Number of visits made by users on the post</a:t>
+            </a:r>
+          </a:p>
+          <a:p>
+            <a:pPr marL="628650" lvl="1" indent="-171450">
+              <a:buFontTx/>
+              <a:buChar char="-"/>
+            </a:pPr>
+            <a:r>
+              <a:rPr lang="en-US" baseline="0" dirty="0" smtClean="0"/>
+              <a:t>Whether the post has an accepted answer or not</a:t>
+            </a:r>
+          </a:p>
+          <a:p>
+            <a:pPr marL="628650" lvl="1" indent="-171450">
+              <a:buFontTx/>
+              <a:buChar char="-"/>
+            </a:pPr>
+            <a:r>
+              <a:rPr lang="en-US" baseline="0" dirty="0" smtClean="0"/>
+              <a:t>We also performed sentiment analysis on comments but that did not contribute well, so we excluded it from our list of metrics.</a:t>
+            </a:r>
           </a:p>
         </p:txBody>
       </p:sp>
@@ -1095,6 +1214,90 @@
 </file>
 
 <file path=ppt/notesSlides/notesSlide7.xml><?xml version="1.0" encoding="utf-8"?>
+<p:notes xmlns:a="http://schemas.openxmlformats.org/drawingml/2006/main" xmlns:r="http://schemas.openxmlformats.org/officeDocument/2006/relationships" xmlns:p="http://schemas.openxmlformats.org/presentationml/2006/main">
+  <p:cSld>
+    <p:spTree>
+      <p:nvGrpSpPr>
+        <p:cNvPr id="1" name=""/>
+        <p:cNvGrpSpPr/>
+        <p:nvPr/>
+      </p:nvGrpSpPr>
+      <p:grpSpPr>
+        <a:xfrm>
+          <a:off x="0" y="0"/>
+          <a:ext cx="0" cy="0"/>
+          <a:chOff x="0" y="0"/>
+          <a:chExt cx="0" cy="0"/>
+        </a:xfrm>
+      </p:grpSpPr>
+      <p:sp>
+        <p:nvSpPr>
+          <p:cNvPr id="2" name="Slide Image Placeholder 1"/>
+          <p:cNvSpPr>
+            <a:spLocks noGrp="1" noRot="1" noChangeAspect="1"/>
+          </p:cNvSpPr>
+          <p:nvPr>
+            <p:ph type="sldImg"/>
+          </p:nvPr>
+        </p:nvSpPr>
+        <p:spPr/>
+      </p:sp>
+      <p:sp>
+        <p:nvSpPr>
+          <p:cNvPr id="3" name="Notes Placeholder 2"/>
+          <p:cNvSpPr>
+            <a:spLocks noGrp="1"/>
+          </p:cNvSpPr>
+          <p:nvPr>
+            <p:ph type="body" idx="1"/>
+          </p:nvPr>
+        </p:nvSpPr>
+        <p:spPr/>
+        <p:txBody>
+          <a:bodyPr/>
+          <a:lstStyle/>
+          <a:p>
+            <a:endParaRPr lang="en-US" dirty="0"/>
+          </a:p>
+        </p:txBody>
+      </p:sp>
+      <p:sp>
+        <p:nvSpPr>
+          <p:cNvPr id="4" name="Slide Number Placeholder 3"/>
+          <p:cNvSpPr>
+            <a:spLocks noGrp="1"/>
+          </p:cNvSpPr>
+          <p:nvPr>
+            <p:ph type="sldNum" sz="quarter" idx="10"/>
+          </p:nvPr>
+        </p:nvSpPr>
+        <p:spPr/>
+        <p:txBody>
+          <a:bodyPr/>
+          <a:lstStyle/>
+          <a:p>
+            <a:fld id="{CF446327-AA5F-7343-A16D-2A76EB998B18}" type="slidenum">
+              <a:rPr lang="en-US" smtClean="0"/>
+              <a:t>9</a:t>
+            </a:fld>
+            <a:endParaRPr lang="en-US"/>
+          </a:p>
+        </p:txBody>
+      </p:sp>
+    </p:spTree>
+    <p:extLst>
+      <p:ext uri="{BB962C8B-B14F-4D97-AF65-F5344CB8AC3E}">
+        <p14:creationId xmlns:p14="http://schemas.microsoft.com/office/powerpoint/2010/main" val="1666610817"/>
+      </p:ext>
+    </p:extLst>
+  </p:cSld>
+  <p:clrMapOvr>
+    <a:masterClrMapping/>
+  </p:clrMapOvr>
+</p:notes>
+</file>
+
+<file path=ppt/notesSlides/notesSlide8.xml><?xml version="1.0" encoding="utf-8"?>
 <p:notes xmlns:a="http://schemas.openxmlformats.org/drawingml/2006/main" xmlns:r="http://schemas.openxmlformats.org/officeDocument/2006/relationships" xmlns:p="http://schemas.openxmlformats.org/presentationml/2006/main">
   <p:cSld>
     <p:spTree>
@@ -8925,7 +9128,12 @@
             <p:ph type="subTitle" idx="1"/>
           </p:nvPr>
         </p:nvSpPr>
-        <p:spPr/>
+        <p:spPr>
+          <a:xfrm>
+            <a:off x="2507021" y="4777379"/>
+            <a:ext cx="8997591" cy="1126283"/>
+          </a:xfrm>
+        </p:spPr>
         <p:txBody>
           <a:bodyPr/>
           <a:lstStyle/>
@@ -9799,7 +10007,7 @@
       </p:grpSpPr>
       <p:sp>
         <p:nvSpPr>
-          <p:cNvPr id="2" name="Title 1"/>
+          <p:cNvPr id="8" name="Title 7"/>
           <p:cNvSpPr>
             <a:spLocks noGrp="1"/>
           </p:cNvSpPr>
@@ -9808,414 +10016,50 @@
           </p:nvPr>
         </p:nvSpPr>
         <p:spPr/>
-        <p:txBody>
-          <a:bodyPr/>
-          <a:lstStyle/>
-          <a:p>
-            <a:r>
-              <a:rPr lang="en-US" dirty="0" smtClean="0"/>
-              <a:t>Development Plan</a:t>
-            </a:r>
-            <a:endParaRPr lang="en-US" dirty="0"/>
-          </a:p>
-        </p:txBody>
-      </p:sp>
-      <p:sp>
-        <p:nvSpPr>
-          <p:cNvPr id="5" name="Content Placeholder 4"/>
-          <p:cNvSpPr>
-            <a:spLocks noGrp="1"/>
-          </p:cNvSpPr>
-          <p:nvPr>
-            <p:ph idx="1"/>
-          </p:nvPr>
-        </p:nvSpPr>
-        <p:spPr>
-          <a:xfrm>
-            <a:off x="2589212" y="1664413"/>
-            <a:ext cx="8915400" cy="4664467"/>
-          </a:xfrm>
-        </p:spPr>
         <p:txBody>
           <a:bodyPr>
             <a:normAutofit/>
           </a:bodyPr>
           <a:lstStyle/>
           <a:p>
-            <a:r>
-              <a:rPr lang="en-US" dirty="0" smtClean="0"/>
-              <a:t>Current Status</a:t>
-            </a:r>
-          </a:p>
-          <a:p>
-            <a:pPr lvl="1"/>
-            <a:r>
-              <a:rPr lang="en-US" dirty="0" smtClean="0"/>
-              <a:t>Collected data from </a:t>
-            </a:r>
-            <a:r>
-              <a:rPr lang="en-US" dirty="0" err="1" smtClean="0"/>
-              <a:t>StackOverflow</a:t>
-            </a:r>
-            <a:endParaRPr lang="en-US" dirty="0" smtClean="0"/>
-          </a:p>
-          <a:p>
-            <a:pPr lvl="1"/>
-            <a:r>
-              <a:rPr lang="en-US" dirty="0"/>
-              <a:t>Created </a:t>
-            </a:r>
-            <a:r>
-              <a:rPr lang="en-US" dirty="0" smtClean="0"/>
-              <a:t>database </a:t>
-            </a:r>
-          </a:p>
-          <a:p>
-            <a:pPr lvl="1"/>
-            <a:r>
-              <a:rPr lang="en-US" dirty="0" smtClean="0"/>
-              <a:t>Designed Mock UI</a:t>
-            </a:r>
-          </a:p>
-          <a:p>
-            <a:endParaRPr lang="en-US" dirty="0" smtClean="0"/>
-          </a:p>
-          <a:p>
-            <a:endParaRPr lang="en-US" dirty="0"/>
-          </a:p>
-          <a:p>
-            <a:r>
-              <a:rPr lang="en-US" dirty="0" smtClean="0"/>
-              <a:t>Phase 1 –  March 11th</a:t>
-            </a:r>
-          </a:p>
-          <a:p>
-            <a:pPr lvl="1"/>
-            <a:r>
-              <a:rPr lang="en-US" dirty="0" smtClean="0"/>
-              <a:t>Clustering posts</a:t>
-            </a:r>
-          </a:p>
-          <a:p>
-            <a:pPr lvl="1"/>
-            <a:r>
-              <a:rPr lang="en-US" dirty="0" smtClean="0"/>
-              <a:t>User interface</a:t>
-            </a:r>
+            <a:pPr algn="ctr"/>
+            <a:r>
+              <a:rPr lang="en-US" sz="4800" b="1" dirty="0" smtClean="0"/>
+              <a:t>Demo</a:t>
+            </a:r>
+            <a:endParaRPr lang="en-US" sz="4800" b="1" dirty="0"/>
+          </a:p>
+        </p:txBody>
+      </p:sp>
+      <p:sp>
+        <p:nvSpPr>
+          <p:cNvPr id="9" name="Text Placeholder 8"/>
+          <p:cNvSpPr>
+            <a:spLocks noGrp="1"/>
+          </p:cNvSpPr>
+          <p:nvPr>
+            <p:ph type="body" idx="1"/>
+          </p:nvPr>
+        </p:nvSpPr>
+        <p:spPr/>
+        <p:txBody>
+          <a:bodyPr/>
+          <a:lstStyle/>
+          <a:p>
+            <a:endParaRPr lang="en-US"/>
           </a:p>
         </p:txBody>
       </p:sp>
     </p:spTree>
     <p:extLst>
       <p:ext uri="{BB962C8B-B14F-4D97-AF65-F5344CB8AC3E}">
-        <p14:creationId xmlns:p14="http://schemas.microsoft.com/office/powerpoint/2010/main" val="1665204916"/>
+        <p14:creationId xmlns:p14="http://schemas.microsoft.com/office/powerpoint/2010/main" val="801116745"/>
       </p:ext>
     </p:extLst>
   </p:cSld>
   <p:clrMapOvr>
     <a:masterClrMapping/>
   </p:clrMapOvr>
-  <mc:AlternateContent xmlns:mc="http://schemas.openxmlformats.org/markup-compatibility/2006" xmlns:p14="http://schemas.microsoft.com/office/powerpoint/2010/main">
-    <mc:Choice Requires="p14">
-      <p:transition spd="med" p14:dur="700">
-        <p:fade/>
-      </p:transition>
-    </mc:Choice>
-    <mc:Fallback xmlns="">
-      <p:transition spd="med">
-        <p:fade/>
-      </p:transition>
-    </mc:Fallback>
-  </mc:AlternateContent>
-  <p:timing>
-    <p:tnLst>
-      <p:par>
-        <p:cTn id="1" dur="indefinite" restart="never" nodeType="tmRoot"/>
-      </p:par>
-    </p:tnLst>
-  </p:timing>
-</p:sld>
-</file>
-
-<file path=ppt/slides/slide14.xml><?xml version="1.0" encoding="utf-8"?>
-<p:sld xmlns:a="http://schemas.openxmlformats.org/drawingml/2006/main" xmlns:r="http://schemas.openxmlformats.org/officeDocument/2006/relationships" xmlns:p="http://schemas.openxmlformats.org/presentationml/2006/main">
-  <p:cSld>
-    <p:spTree>
-      <p:nvGrpSpPr>
-        <p:cNvPr id="1" name=""/>
-        <p:cNvGrpSpPr/>
-        <p:nvPr/>
-      </p:nvGrpSpPr>
-      <p:grpSpPr>
-        <a:xfrm>
-          <a:off x="0" y="0"/>
-          <a:ext cx="0" cy="0"/>
-          <a:chOff x="0" y="0"/>
-          <a:chExt cx="0" cy="0"/>
-        </a:xfrm>
-      </p:grpSpPr>
-      <p:sp>
-        <p:nvSpPr>
-          <p:cNvPr id="2" name="Title 1"/>
-          <p:cNvSpPr>
-            <a:spLocks noGrp="1"/>
-          </p:cNvSpPr>
-          <p:nvPr>
-            <p:ph type="title"/>
-          </p:nvPr>
-        </p:nvSpPr>
-        <p:spPr/>
-        <p:txBody>
-          <a:bodyPr/>
-          <a:lstStyle/>
-          <a:p>
-            <a:r>
-              <a:rPr lang="en-US" dirty="0"/>
-              <a:t>Development Plan</a:t>
-            </a:r>
-            <a:endParaRPr lang="en-IN" dirty="0"/>
-          </a:p>
-        </p:txBody>
-      </p:sp>
-      <p:sp>
-        <p:nvSpPr>
-          <p:cNvPr id="3" name="Content Placeholder 2"/>
-          <p:cNvSpPr>
-            <a:spLocks noGrp="1"/>
-          </p:cNvSpPr>
-          <p:nvPr>
-            <p:ph idx="1"/>
-          </p:nvPr>
-        </p:nvSpPr>
-        <p:spPr/>
-        <p:txBody>
-          <a:bodyPr>
-            <a:normAutofit lnSpcReduction="10000"/>
-          </a:bodyPr>
-          <a:lstStyle/>
-          <a:p>
-            <a:endParaRPr lang="en-US" dirty="0"/>
-          </a:p>
-          <a:p>
-            <a:r>
-              <a:rPr lang="en-US" dirty="0"/>
-              <a:t>Phase 2 – March 25</a:t>
-            </a:r>
-            <a:r>
-              <a:rPr lang="en-US" baseline="30000" dirty="0"/>
-              <a:t>th</a:t>
-            </a:r>
-          </a:p>
-          <a:p>
-            <a:pPr lvl="1"/>
-            <a:r>
-              <a:rPr lang="en-US" dirty="0"/>
-              <a:t>Implementing user and content models</a:t>
-            </a:r>
-          </a:p>
-          <a:p>
-            <a:pPr lvl="1"/>
-            <a:r>
-              <a:rPr lang="en-US" dirty="0"/>
-              <a:t>Adaptation system</a:t>
-            </a:r>
-          </a:p>
-          <a:p>
-            <a:endParaRPr lang="en-US" dirty="0"/>
-          </a:p>
-          <a:p>
-            <a:r>
-              <a:rPr lang="en-US" dirty="0"/>
-              <a:t>Phase 3 – April 8</a:t>
-            </a:r>
-            <a:r>
-              <a:rPr lang="en-US" baseline="30000" dirty="0"/>
-              <a:t>th</a:t>
-            </a:r>
-            <a:r>
-              <a:rPr lang="en-US" dirty="0"/>
-              <a:t> </a:t>
-            </a:r>
-          </a:p>
-          <a:p>
-            <a:pPr lvl="1"/>
-            <a:r>
-              <a:rPr lang="en-US" dirty="0"/>
-              <a:t>System Integration </a:t>
-            </a:r>
-          </a:p>
-          <a:p>
-            <a:pPr lvl="1"/>
-            <a:endParaRPr lang="en-US" dirty="0"/>
-          </a:p>
-          <a:p>
-            <a:r>
-              <a:rPr lang="en-US" dirty="0"/>
-              <a:t>Final Phase </a:t>
-            </a:r>
-          </a:p>
-          <a:p>
-            <a:pPr lvl="1"/>
-            <a:r>
-              <a:rPr lang="en-US" dirty="0"/>
-              <a:t>Evaluation</a:t>
-            </a:r>
-          </a:p>
-          <a:p>
-            <a:endParaRPr lang="en-IN" dirty="0"/>
-          </a:p>
-        </p:txBody>
-      </p:sp>
-    </p:spTree>
-    <p:extLst>
-      <p:ext uri="{BB962C8B-B14F-4D97-AF65-F5344CB8AC3E}">
-        <p14:creationId xmlns:p14="http://schemas.microsoft.com/office/powerpoint/2010/main" val="3472667569"/>
-      </p:ext>
-    </p:extLst>
-  </p:cSld>
-  <p:clrMapOvr>
-    <a:masterClrMapping/>
-  </p:clrMapOvr>
-  <p:timing>
-    <p:tnLst>
-      <p:par>
-        <p:cTn id="1" dur="indefinite" restart="never" nodeType="tmRoot"/>
-      </p:par>
-    </p:tnLst>
-  </p:timing>
-</p:sld>
-</file>
-
-<file path=ppt/slides/slide15.xml><?xml version="1.0" encoding="utf-8"?>
-<p:sld xmlns:a="http://schemas.openxmlformats.org/drawingml/2006/main" xmlns:r="http://schemas.openxmlformats.org/officeDocument/2006/relationships" xmlns:p="http://schemas.openxmlformats.org/presentationml/2006/main">
-  <p:cSld>
-    <p:spTree>
-      <p:nvGrpSpPr>
-        <p:cNvPr id="1" name=""/>
-        <p:cNvGrpSpPr/>
-        <p:nvPr/>
-      </p:nvGrpSpPr>
-      <p:grpSpPr>
-        <a:xfrm>
-          <a:off x="0" y="0"/>
-          <a:ext cx="0" cy="0"/>
-          <a:chOff x="0" y="0"/>
-          <a:chExt cx="0" cy="0"/>
-        </a:xfrm>
-      </p:grpSpPr>
-      <p:sp>
-        <p:nvSpPr>
-          <p:cNvPr id="2" name="Title 1"/>
-          <p:cNvSpPr>
-            <a:spLocks noGrp="1"/>
-          </p:cNvSpPr>
-          <p:nvPr>
-            <p:ph type="title"/>
-          </p:nvPr>
-        </p:nvSpPr>
-        <p:spPr/>
-        <p:txBody>
-          <a:bodyPr/>
-          <a:lstStyle/>
-          <a:p>
-            <a:endParaRPr lang="en-US" dirty="0"/>
-          </a:p>
-        </p:txBody>
-      </p:sp>
-      <p:sp>
-        <p:nvSpPr>
-          <p:cNvPr id="3" name="Content Placeholder 2"/>
-          <p:cNvSpPr>
-            <a:spLocks noGrp="1"/>
-          </p:cNvSpPr>
-          <p:nvPr>
-            <p:ph idx="1"/>
-          </p:nvPr>
-        </p:nvSpPr>
-        <p:spPr>
-          <a:xfrm>
-            <a:off x="7102258" y="2133600"/>
-            <a:ext cx="4402354" cy="3777622"/>
-          </a:xfrm>
-        </p:spPr>
-        <p:txBody>
-          <a:bodyPr/>
-          <a:lstStyle/>
-          <a:p>
-            <a:r>
-              <a:rPr lang="en-US" dirty="0" smtClean="0">
-                <a:latin typeface="Apple Chancery" charset="0"/>
-                <a:ea typeface="Apple Chancery" charset="0"/>
-                <a:cs typeface="Apple Chancery" charset="0"/>
-              </a:rPr>
-              <a:t>Global warming is real!</a:t>
-            </a:r>
-          </a:p>
-          <a:p>
-            <a:r>
-              <a:rPr lang="en-US" dirty="0" smtClean="0">
-                <a:latin typeface="Apple Chancery" charset="0"/>
-                <a:ea typeface="Apple Chancery" charset="0"/>
-                <a:cs typeface="Apple Chancery" charset="0"/>
-              </a:rPr>
-              <a:t>We cannot take this planet for granted!</a:t>
-            </a:r>
-          </a:p>
-          <a:p>
-            <a:endParaRPr lang="en-US" dirty="0"/>
-          </a:p>
-          <a:p>
-            <a:r>
-              <a:rPr lang="en-US" dirty="0" smtClean="0"/>
-              <a:t>We DO NOT take this project for granted !</a:t>
-            </a:r>
-          </a:p>
-        </p:txBody>
-      </p:sp>
-      <p:pic>
-        <p:nvPicPr>
-          <p:cNvPr id="5" name="Picture 4"/>
-          <p:cNvPicPr>
-            <a:picLocks noChangeAspect="1"/>
-          </p:cNvPicPr>
-          <p:nvPr/>
-        </p:nvPicPr>
-        <p:blipFill>
-          <a:blip r:embed="rId2"/>
-          <a:stretch>
-            <a:fillRect/>
-          </a:stretch>
-        </p:blipFill>
-        <p:spPr>
-          <a:xfrm>
-            <a:off x="2276714" y="336434"/>
-            <a:ext cx="4675418" cy="6233890"/>
-          </a:xfrm>
-          <a:prstGeom prst="rect">
-            <a:avLst/>
-          </a:prstGeom>
-        </p:spPr>
-      </p:pic>
-    </p:spTree>
-    <p:extLst>
-      <p:ext uri="{BB962C8B-B14F-4D97-AF65-F5344CB8AC3E}">
-        <p14:creationId xmlns:p14="http://schemas.microsoft.com/office/powerpoint/2010/main" val="235202254"/>
-      </p:ext>
-    </p:extLst>
-  </p:cSld>
-  <p:clrMapOvr>
-    <a:masterClrMapping/>
-  </p:clrMapOvr>
-  <p:transition spd="slow">
-    <p:push dir="u"/>
-  </p:transition>
-  <p:timing>
-    <p:tnLst>
-      <p:par>
-        <p:cTn id="1" dur="indefinite" restart="never" nodeType="tmRoot"/>
-      </p:par>
-    </p:tnLst>
-  </p:timing>
 </p:sld>
 </file>
 
@@ -11016,7 +10860,7 @@
           <a:p>
             <a:pPr fontAlgn="base"/>
             <a:r>
-              <a:rPr lang="en-US" sz="2200" b="1" dirty="0" smtClean="0"/>
+              <a:rPr lang="en-US" sz="2000" b="1" dirty="0" smtClean="0"/>
               <a:t>Usefulness</a:t>
             </a:r>
           </a:p>
@@ -11349,12 +11193,8 @@
           <a:p>
             <a:pPr lvl="1" fontAlgn="base"/>
             <a:r>
-              <a:rPr lang="en-US" sz="1800" dirty="0"/>
-              <a:t>User </a:t>
-            </a:r>
-            <a:r>
               <a:rPr lang="en-US" sz="1800" dirty="0" smtClean="0"/>
-              <a:t>ratings</a:t>
+              <a:t>User ratings</a:t>
             </a:r>
           </a:p>
           <a:p>

</xml_diff>